<commit_message>
CT: update sesion 12
</commit_message>
<xml_diff>
--- a/COMPONENTE_TEORICO/Slide-Software - Sesión 12 - Semana 4.pptx
+++ b/COMPONENTE_TEORICO/Slide-Software - Sesión 12 - Semana 4.pptx
@@ -1133,7 +1133,7 @@
       </p:grpSpPr>
       <p:sp>
         <p:nvSpPr>
-          <p:cNvPr id="202" name="Google Shape;202;ge3cf71f4e1_0_27:notes"/>
+          <p:cNvPr id="202" name="Google Shape;202;gf7037cec87_1_0:notes"/>
           <p:cNvSpPr txBox="1"/>
           <p:nvPr>
             <p:ph idx="1" type="body"/>
@@ -1180,7 +1180,7 @@
       </p:sp>
       <p:sp>
         <p:nvSpPr>
-          <p:cNvPr id="203" name="Google Shape;203;ge3cf71f4e1_0_27:notes"/>
+          <p:cNvPr id="203" name="Google Shape;203;gf7037cec87_1_0:notes"/>
           <p:cNvSpPr/>
           <p:nvPr>
             <p:ph idx="2" type="sldImg"/>
@@ -1236,7 +1236,7 @@
   <p:cSld>
     <p:spTree>
       <p:nvGrpSpPr>
-        <p:cNvPr id="208" name="Shape 208"/>
+        <p:cNvPr id="210" name="Shape 210"/>
         <p:cNvGrpSpPr/>
         <p:nvPr/>
       </p:nvGrpSpPr>
@@ -1250,7 +1250,7 @@
       </p:grpSpPr>
       <p:sp>
         <p:nvSpPr>
-          <p:cNvPr id="209" name="Google Shape;209;ge3cf71f4e1_0_24:notes"/>
+          <p:cNvPr id="211" name="Google Shape;211;ge3cf71f4e1_0_24:notes"/>
           <p:cNvSpPr txBox="1"/>
           <p:nvPr>
             <p:ph idx="1" type="body"/>
@@ -1297,7 +1297,7 @@
       </p:sp>
       <p:sp>
         <p:nvSpPr>
-          <p:cNvPr id="210" name="Google Shape;210;ge3cf71f4e1_0_24:notes"/>
+          <p:cNvPr id="212" name="Google Shape;212;ge3cf71f4e1_0_24:notes"/>
           <p:cNvSpPr/>
           <p:nvPr>
             <p:ph idx="2" type="sldImg"/>
@@ -1353,7 +1353,7 @@
   <p:cSld>
     <p:spTree>
       <p:nvGrpSpPr>
-        <p:cNvPr id="214" name="Shape 214"/>
+        <p:cNvPr id="216" name="Shape 216"/>
         <p:cNvGrpSpPr/>
         <p:nvPr/>
       </p:nvGrpSpPr>
@@ -1367,7 +1367,7 @@
       </p:grpSpPr>
       <p:sp>
         <p:nvSpPr>
-          <p:cNvPr id="215" name="Google Shape;215;ge3cf71f4e1_0_21:notes"/>
+          <p:cNvPr id="217" name="Google Shape;217;ge3cf71f4e1_0_21:notes"/>
           <p:cNvSpPr txBox="1"/>
           <p:nvPr>
             <p:ph idx="1" type="body"/>
@@ -1414,7 +1414,7 @@
       </p:sp>
       <p:sp>
         <p:nvSpPr>
-          <p:cNvPr id="216" name="Google Shape;216;ge3cf71f4e1_0_21:notes"/>
+          <p:cNvPr id="218" name="Google Shape;218;ge3cf71f4e1_0_21:notes"/>
           <p:cNvSpPr/>
           <p:nvPr>
             <p:ph idx="2" type="sldImg"/>
@@ -1470,7 +1470,7 @@
   <p:cSld>
     <p:spTree>
       <p:nvGrpSpPr>
-        <p:cNvPr id="220" name="Shape 220"/>
+        <p:cNvPr id="222" name="Shape 222"/>
         <p:cNvGrpSpPr/>
         <p:nvPr/>
       </p:nvGrpSpPr>
@@ -1484,7 +1484,7 @@
       </p:grpSpPr>
       <p:sp>
         <p:nvSpPr>
-          <p:cNvPr id="221" name="Google Shape;221;ge3cf71f4e1_0_18:notes"/>
+          <p:cNvPr id="223" name="Google Shape;223;ge3cf71f4e1_0_18:notes"/>
           <p:cNvSpPr txBox="1"/>
           <p:nvPr>
             <p:ph idx="1" type="body"/>
@@ -1531,7 +1531,7 @@
       </p:sp>
       <p:sp>
         <p:nvSpPr>
-          <p:cNvPr id="222" name="Google Shape;222;ge3cf71f4e1_0_18:notes"/>
+          <p:cNvPr id="224" name="Google Shape;224;ge3cf71f4e1_0_18:notes"/>
           <p:cNvSpPr/>
           <p:nvPr>
             <p:ph idx="2" type="sldImg"/>
@@ -1587,7 +1587,7 @@
   <p:cSld>
     <p:spTree>
       <p:nvGrpSpPr>
-        <p:cNvPr id="227" name="Shape 227"/>
+        <p:cNvPr id="229" name="Shape 229"/>
         <p:cNvGrpSpPr/>
         <p:nvPr/>
       </p:nvGrpSpPr>
@@ -1601,7 +1601,7 @@
       </p:grpSpPr>
       <p:sp>
         <p:nvSpPr>
-          <p:cNvPr id="228" name="Google Shape;228;ge2f4db1192_0_26:notes"/>
+          <p:cNvPr id="230" name="Google Shape;230;ge2f4db1192_0_26:notes"/>
           <p:cNvSpPr txBox="1"/>
           <p:nvPr>
             <p:ph idx="1" type="body"/>
@@ -1648,7 +1648,7 @@
       </p:sp>
       <p:sp>
         <p:nvSpPr>
-          <p:cNvPr id="229" name="Google Shape;229;ge2f4db1192_0_26:notes"/>
+          <p:cNvPr id="231" name="Google Shape;231;ge2f4db1192_0_26:notes"/>
           <p:cNvSpPr/>
           <p:nvPr>
             <p:ph idx="2" type="sldImg"/>
@@ -1704,7 +1704,7 @@
   <p:cSld>
     <p:spTree>
       <p:nvGrpSpPr>
-        <p:cNvPr id="233" name="Shape 233"/>
+        <p:cNvPr id="235" name="Shape 235"/>
         <p:cNvGrpSpPr/>
         <p:nvPr/>
       </p:nvGrpSpPr>
@@ -1718,7 +1718,7 @@
       </p:grpSpPr>
       <p:sp>
         <p:nvSpPr>
-          <p:cNvPr id="234" name="Google Shape;234;ge2f4db1192_0_29:notes"/>
+          <p:cNvPr id="236" name="Google Shape;236;ge2f4db1192_0_29:notes"/>
           <p:cNvSpPr txBox="1"/>
           <p:nvPr>
             <p:ph idx="1" type="body"/>
@@ -1765,7 +1765,7 @@
       </p:sp>
       <p:sp>
         <p:nvSpPr>
-          <p:cNvPr id="235" name="Google Shape;235;ge2f4db1192_0_29:notes"/>
+          <p:cNvPr id="237" name="Google Shape;237;ge2f4db1192_0_29:notes"/>
           <p:cNvSpPr/>
           <p:nvPr>
             <p:ph idx="2" type="sldImg"/>
@@ -1821,7 +1821,7 @@
   <p:cSld>
     <p:spTree>
       <p:nvGrpSpPr>
-        <p:cNvPr id="239" name="Shape 239"/>
+        <p:cNvPr id="241" name="Shape 241"/>
         <p:cNvGrpSpPr/>
         <p:nvPr/>
       </p:nvGrpSpPr>
@@ -1835,7 +1835,7 @@
       </p:grpSpPr>
       <p:sp>
         <p:nvSpPr>
-          <p:cNvPr id="240" name="Google Shape;240;ge3cf71f4e1_0_15:notes"/>
+          <p:cNvPr id="242" name="Google Shape;242;ge3cf71f4e1_0_15:notes"/>
           <p:cNvSpPr txBox="1"/>
           <p:nvPr>
             <p:ph idx="1" type="body"/>
@@ -1882,7 +1882,7 @@
       </p:sp>
       <p:sp>
         <p:nvSpPr>
-          <p:cNvPr id="241" name="Google Shape;241;ge3cf71f4e1_0_15:notes"/>
+          <p:cNvPr id="243" name="Google Shape;243;ge3cf71f4e1_0_15:notes"/>
           <p:cNvSpPr/>
           <p:nvPr>
             <p:ph idx="2" type="sldImg"/>
@@ -1938,7 +1938,7 @@
   <p:cSld>
     <p:spTree>
       <p:nvGrpSpPr>
-        <p:cNvPr id="245" name="Shape 245"/>
+        <p:cNvPr id="247" name="Shape 247"/>
         <p:cNvGrpSpPr/>
         <p:nvPr/>
       </p:nvGrpSpPr>
@@ -1952,7 +1952,7 @@
       </p:grpSpPr>
       <p:sp>
         <p:nvSpPr>
-          <p:cNvPr id="246" name="Google Shape;246;ge2f46cac3f_0_32:notes"/>
+          <p:cNvPr id="248" name="Google Shape;248;ge2f46cac3f_0_32:notes"/>
           <p:cNvSpPr txBox="1"/>
           <p:nvPr>
             <p:ph idx="1" type="body"/>
@@ -1999,7 +1999,7 @@
       </p:sp>
       <p:sp>
         <p:nvSpPr>
-          <p:cNvPr id="247" name="Google Shape;247;ge2f46cac3f_0_32:notes"/>
+          <p:cNvPr id="249" name="Google Shape;249;ge2f46cac3f_0_32:notes"/>
           <p:cNvSpPr/>
           <p:nvPr>
             <p:ph idx="2" type="sldImg"/>
@@ -2055,7 +2055,7 @@
   <p:cSld>
     <p:spTree>
       <p:nvGrpSpPr>
-        <p:cNvPr id="251" name="Shape 251"/>
+        <p:cNvPr id="253" name="Shape 253"/>
         <p:cNvGrpSpPr/>
         <p:nvPr/>
       </p:nvGrpSpPr>
@@ -2069,7 +2069,7 @@
       </p:grpSpPr>
       <p:sp>
         <p:nvSpPr>
-          <p:cNvPr id="252" name="Google Shape;252;ge2f46cac3f_0_37:notes"/>
+          <p:cNvPr id="254" name="Google Shape;254;ge2f46cac3f_0_37:notes"/>
           <p:cNvSpPr txBox="1"/>
           <p:nvPr>
             <p:ph idx="1" type="body"/>
@@ -2116,7 +2116,7 @@
       </p:sp>
       <p:sp>
         <p:nvSpPr>
-          <p:cNvPr id="253" name="Google Shape;253;ge2f46cac3f_0_37:notes"/>
+          <p:cNvPr id="255" name="Google Shape;255;ge2f46cac3f_0_37:notes"/>
           <p:cNvSpPr/>
           <p:nvPr>
             <p:ph idx="2" type="sldImg"/>
@@ -2289,7 +2289,7 @@
   <p:cSld>
     <p:spTree>
       <p:nvGrpSpPr>
-        <p:cNvPr id="257" name="Shape 257"/>
+        <p:cNvPr id="259" name="Shape 259"/>
         <p:cNvGrpSpPr/>
         <p:nvPr/>
       </p:nvGrpSpPr>
@@ -2303,7 +2303,7 @@
       </p:grpSpPr>
       <p:sp>
         <p:nvSpPr>
-          <p:cNvPr id="258" name="Google Shape;258;ge2f4db1192_0_75:notes"/>
+          <p:cNvPr id="260" name="Google Shape;260;ge2f4db1192_0_75:notes"/>
           <p:cNvSpPr txBox="1"/>
           <p:nvPr>
             <p:ph idx="1" type="body"/>
@@ -2350,7 +2350,7 @@
       </p:sp>
       <p:sp>
         <p:nvSpPr>
-          <p:cNvPr id="259" name="Google Shape;259;ge2f4db1192_0_75:notes"/>
+          <p:cNvPr id="261" name="Google Shape;261;ge2f4db1192_0_75:notes"/>
           <p:cNvSpPr/>
           <p:nvPr>
             <p:ph idx="2" type="sldImg"/>
@@ -2406,7 +2406,7 @@
   <p:cSld>
     <p:spTree>
       <p:nvGrpSpPr>
-        <p:cNvPr id="263" name="Shape 263"/>
+        <p:cNvPr id="265" name="Shape 265"/>
         <p:cNvGrpSpPr/>
         <p:nvPr/>
       </p:nvGrpSpPr>
@@ -2420,7 +2420,7 @@
       </p:grpSpPr>
       <p:sp>
         <p:nvSpPr>
-          <p:cNvPr id="264" name="Google Shape;264;ge2f4db1192_0_71:notes"/>
+          <p:cNvPr id="266" name="Google Shape;266;ge2f4db1192_0_71:notes"/>
           <p:cNvSpPr txBox="1"/>
           <p:nvPr>
             <p:ph idx="1" type="body"/>
@@ -2467,7 +2467,7 @@
       </p:sp>
       <p:sp>
         <p:nvSpPr>
-          <p:cNvPr id="265" name="Google Shape;265;ge2f4db1192_0_71:notes"/>
+          <p:cNvPr id="267" name="Google Shape;267;ge2f4db1192_0_71:notes"/>
           <p:cNvSpPr/>
           <p:nvPr>
             <p:ph idx="2" type="sldImg"/>
@@ -2523,7 +2523,7 @@
   <p:cSld>
     <p:spTree>
       <p:nvGrpSpPr>
-        <p:cNvPr id="270" name="Shape 270"/>
+        <p:cNvPr id="272" name="Shape 272"/>
         <p:cNvGrpSpPr/>
         <p:nvPr/>
       </p:nvGrpSpPr>
@@ -2537,7 +2537,7 @@
       </p:grpSpPr>
       <p:sp>
         <p:nvSpPr>
-          <p:cNvPr id="271" name="Google Shape;271;ge2f4db1192_0_67:notes"/>
+          <p:cNvPr id="273" name="Google Shape;273;ge2f4db1192_0_67:notes"/>
           <p:cNvSpPr txBox="1"/>
           <p:nvPr>
             <p:ph idx="1" type="body"/>
@@ -2584,7 +2584,7 @@
       </p:sp>
       <p:sp>
         <p:nvSpPr>
-          <p:cNvPr id="272" name="Google Shape;272;ge2f4db1192_0_67:notes"/>
+          <p:cNvPr id="274" name="Google Shape;274;ge2f4db1192_0_67:notes"/>
           <p:cNvSpPr/>
           <p:nvPr>
             <p:ph idx="2" type="sldImg"/>
@@ -2640,7 +2640,7 @@
   <p:cSld>
     <p:spTree>
       <p:nvGrpSpPr>
-        <p:cNvPr id="277" name="Shape 277"/>
+        <p:cNvPr id="279" name="Shape 279"/>
         <p:cNvGrpSpPr/>
         <p:nvPr/>
       </p:nvGrpSpPr>
@@ -2654,7 +2654,7 @@
       </p:grpSpPr>
       <p:sp>
         <p:nvSpPr>
-          <p:cNvPr id="278" name="Google Shape;278;ge2f4db1192_0_63:notes"/>
+          <p:cNvPr id="280" name="Google Shape;280;ge2f4db1192_0_63:notes"/>
           <p:cNvSpPr txBox="1"/>
           <p:nvPr>
             <p:ph idx="1" type="body"/>
@@ -2701,7 +2701,7 @@
       </p:sp>
       <p:sp>
         <p:nvSpPr>
-          <p:cNvPr id="279" name="Google Shape;279;ge2f4db1192_0_63:notes"/>
+          <p:cNvPr id="281" name="Google Shape;281;ge2f4db1192_0_63:notes"/>
           <p:cNvSpPr/>
           <p:nvPr>
             <p:ph idx="2" type="sldImg"/>
@@ -2757,7 +2757,7 @@
   <p:cSld>
     <p:spTree>
       <p:nvGrpSpPr>
-        <p:cNvPr id="284" name="Shape 284"/>
+        <p:cNvPr id="286" name="Shape 286"/>
         <p:cNvGrpSpPr/>
         <p:nvPr/>
       </p:nvGrpSpPr>
@@ -2771,7 +2771,7 @@
       </p:grpSpPr>
       <p:sp>
         <p:nvSpPr>
-          <p:cNvPr id="285" name="Google Shape;285;ge2f4db1192_0_59:notes"/>
+          <p:cNvPr id="287" name="Google Shape;287;ge2f4db1192_0_59:notes"/>
           <p:cNvSpPr txBox="1"/>
           <p:nvPr>
             <p:ph idx="1" type="body"/>
@@ -2818,7 +2818,7 @@
       </p:sp>
       <p:sp>
         <p:nvSpPr>
-          <p:cNvPr id="286" name="Google Shape;286;ge2f4db1192_0_59:notes"/>
+          <p:cNvPr id="288" name="Google Shape;288;ge2f4db1192_0_59:notes"/>
           <p:cNvSpPr/>
           <p:nvPr>
             <p:ph idx="2" type="sldImg"/>
@@ -2874,7 +2874,7 @@
   <p:cSld>
     <p:spTree>
       <p:nvGrpSpPr>
-        <p:cNvPr id="290" name="Shape 290"/>
+        <p:cNvPr id="292" name="Shape 292"/>
         <p:cNvGrpSpPr/>
         <p:nvPr/>
       </p:nvGrpSpPr>
@@ -2888,7 +2888,7 @@
       </p:grpSpPr>
       <p:sp>
         <p:nvSpPr>
-          <p:cNvPr id="291" name="Google Shape;291;ge2f4db1192_0_55:notes"/>
+          <p:cNvPr id="293" name="Google Shape;293;ge2f4db1192_0_55:notes"/>
           <p:cNvSpPr txBox="1"/>
           <p:nvPr>
             <p:ph idx="1" type="body"/>
@@ -2935,7 +2935,7 @@
       </p:sp>
       <p:sp>
         <p:nvSpPr>
-          <p:cNvPr id="292" name="Google Shape;292;ge2f4db1192_0_55:notes"/>
+          <p:cNvPr id="294" name="Google Shape;294;ge2f4db1192_0_55:notes"/>
           <p:cNvSpPr/>
           <p:nvPr>
             <p:ph idx="2" type="sldImg"/>
@@ -2991,7 +2991,7 @@
   <p:cSld>
     <p:spTree>
       <p:nvGrpSpPr>
-        <p:cNvPr id="297" name="Shape 297"/>
+        <p:cNvPr id="299" name="Shape 299"/>
         <p:cNvGrpSpPr/>
         <p:nvPr/>
       </p:nvGrpSpPr>
@@ -3005,7 +3005,7 @@
       </p:grpSpPr>
       <p:sp>
         <p:nvSpPr>
-          <p:cNvPr id="298" name="Google Shape;298;ge2f4db1192_0_51:notes"/>
+          <p:cNvPr id="300" name="Google Shape;300;ge2f4db1192_0_51:notes"/>
           <p:cNvSpPr txBox="1"/>
           <p:nvPr>
             <p:ph idx="1" type="body"/>
@@ -3052,7 +3052,7 @@
       </p:sp>
       <p:sp>
         <p:nvSpPr>
-          <p:cNvPr id="299" name="Google Shape;299;ge2f4db1192_0_51:notes"/>
+          <p:cNvPr id="301" name="Google Shape;301;ge2f4db1192_0_51:notes"/>
           <p:cNvSpPr/>
           <p:nvPr>
             <p:ph idx="2" type="sldImg"/>
@@ -3108,7 +3108,7 @@
   <p:cSld>
     <p:spTree>
       <p:nvGrpSpPr>
-        <p:cNvPr id="304" name="Shape 304"/>
+        <p:cNvPr id="306" name="Shape 306"/>
         <p:cNvGrpSpPr/>
         <p:nvPr/>
       </p:nvGrpSpPr>
@@ -3122,7 +3122,7 @@
       </p:grpSpPr>
       <p:sp>
         <p:nvSpPr>
-          <p:cNvPr id="305" name="Google Shape;305;ge2f4db1192_0_47:notes"/>
+          <p:cNvPr id="307" name="Google Shape;307;ge2f4db1192_0_47:notes"/>
           <p:cNvSpPr txBox="1"/>
           <p:nvPr>
             <p:ph idx="1" type="body"/>
@@ -3169,7 +3169,7 @@
       </p:sp>
       <p:sp>
         <p:nvSpPr>
-          <p:cNvPr id="306" name="Google Shape;306;ge2f4db1192_0_47:notes"/>
+          <p:cNvPr id="308" name="Google Shape;308;ge2f4db1192_0_47:notes"/>
           <p:cNvSpPr/>
           <p:nvPr>
             <p:ph idx="2" type="sldImg"/>
@@ -3225,7 +3225,7 @@
   <p:cSld>
     <p:spTree>
       <p:nvGrpSpPr>
-        <p:cNvPr id="311" name="Shape 311"/>
+        <p:cNvPr id="313" name="Shape 313"/>
         <p:cNvGrpSpPr/>
         <p:nvPr/>
       </p:nvGrpSpPr>
@@ -3239,7 +3239,7 @@
       </p:grpSpPr>
       <p:sp>
         <p:nvSpPr>
-          <p:cNvPr id="312" name="Google Shape;312;ge2f4db1192_0_91:notes"/>
+          <p:cNvPr id="314" name="Google Shape;314;ge2f4db1192_0_91:notes"/>
           <p:cNvSpPr txBox="1"/>
           <p:nvPr>
             <p:ph idx="1" type="body"/>
@@ -3286,7 +3286,7 @@
       </p:sp>
       <p:sp>
         <p:nvSpPr>
-          <p:cNvPr id="313" name="Google Shape;313;ge2f4db1192_0_91:notes"/>
+          <p:cNvPr id="315" name="Google Shape;315;ge2f4db1192_0_91:notes"/>
           <p:cNvSpPr/>
           <p:nvPr>
             <p:ph idx="2" type="sldImg"/>
@@ -3342,7 +3342,7 @@
   <p:cSld>
     <p:spTree>
       <p:nvGrpSpPr>
-        <p:cNvPr id="317" name="Shape 317"/>
+        <p:cNvPr id="319" name="Shape 319"/>
         <p:cNvGrpSpPr/>
         <p:nvPr/>
       </p:nvGrpSpPr>
@@ -3356,7 +3356,7 @@
       </p:grpSpPr>
       <p:sp>
         <p:nvSpPr>
-          <p:cNvPr id="318" name="Google Shape;318;ge2f4db1192_0_87:notes"/>
+          <p:cNvPr id="320" name="Google Shape;320;ge2f4db1192_0_87:notes"/>
           <p:cNvSpPr txBox="1"/>
           <p:nvPr>
             <p:ph idx="1" type="body"/>
@@ -3403,7 +3403,7 @@
       </p:sp>
       <p:sp>
         <p:nvSpPr>
-          <p:cNvPr id="319" name="Google Shape;319;ge2f4db1192_0_87:notes"/>
+          <p:cNvPr id="321" name="Google Shape;321;ge2f4db1192_0_87:notes"/>
           <p:cNvSpPr/>
           <p:nvPr>
             <p:ph idx="2" type="sldImg"/>
@@ -3576,7 +3576,7 @@
   <p:cSld>
     <p:spTree>
       <p:nvGrpSpPr>
-        <p:cNvPr id="323" name="Shape 323"/>
+        <p:cNvPr id="325" name="Shape 325"/>
         <p:cNvGrpSpPr/>
         <p:nvPr/>
       </p:nvGrpSpPr>
@@ -3590,7 +3590,7 @@
       </p:grpSpPr>
       <p:sp>
         <p:nvSpPr>
-          <p:cNvPr id="324" name="Google Shape;324;ge2f4db1192_0_83:notes"/>
+          <p:cNvPr id="326" name="Google Shape;326;ge2f4db1192_0_83:notes"/>
           <p:cNvSpPr txBox="1"/>
           <p:nvPr>
             <p:ph idx="1" type="body"/>
@@ -3637,7 +3637,7 @@
       </p:sp>
       <p:sp>
         <p:nvSpPr>
-          <p:cNvPr id="325" name="Google Shape;325;ge2f4db1192_0_83:notes"/>
+          <p:cNvPr id="327" name="Google Shape;327;ge2f4db1192_0_83:notes"/>
           <p:cNvSpPr/>
           <p:nvPr>
             <p:ph idx="2" type="sldImg"/>
@@ -3693,7 +3693,7 @@
   <p:cSld>
     <p:spTree>
       <p:nvGrpSpPr>
-        <p:cNvPr id="329" name="Shape 329"/>
+        <p:cNvPr id="331" name="Shape 331"/>
         <p:cNvGrpSpPr/>
         <p:nvPr/>
       </p:nvGrpSpPr>
@@ -3707,7 +3707,7 @@
       </p:grpSpPr>
       <p:sp>
         <p:nvSpPr>
-          <p:cNvPr id="330" name="Google Shape;330;ge2f4db1192_0_43:notes"/>
+          <p:cNvPr id="332" name="Google Shape;332;ge2f4db1192_0_43:notes"/>
           <p:cNvSpPr txBox="1"/>
           <p:nvPr>
             <p:ph idx="1" type="body"/>
@@ -3754,7 +3754,7 @@
       </p:sp>
       <p:sp>
         <p:nvSpPr>
-          <p:cNvPr id="331" name="Google Shape;331;ge2f4db1192_0_43:notes"/>
+          <p:cNvPr id="333" name="Google Shape;333;ge2f4db1192_0_43:notes"/>
           <p:cNvSpPr/>
           <p:nvPr>
             <p:ph idx="2" type="sldImg"/>
@@ -3810,7 +3810,7 @@
   <p:cSld>
     <p:spTree>
       <p:nvGrpSpPr>
-        <p:cNvPr id="335" name="Shape 335"/>
+        <p:cNvPr id="337" name="Shape 337"/>
         <p:cNvGrpSpPr/>
         <p:nvPr/>
       </p:nvGrpSpPr>
@@ -3824,7 +3824,7 @@
       </p:grpSpPr>
       <p:sp>
         <p:nvSpPr>
-          <p:cNvPr id="336" name="Google Shape;336;ge2f4db1192_0_79:notes"/>
+          <p:cNvPr id="338" name="Google Shape;338;ge2f4db1192_0_79:notes"/>
           <p:cNvSpPr txBox="1"/>
           <p:nvPr>
             <p:ph idx="1" type="body"/>
@@ -3871,7 +3871,7 @@
       </p:sp>
       <p:sp>
         <p:nvSpPr>
-          <p:cNvPr id="337" name="Google Shape;337;ge2f4db1192_0_79:notes"/>
+          <p:cNvPr id="339" name="Google Shape;339;ge2f4db1192_0_79:notes"/>
           <p:cNvSpPr/>
           <p:nvPr>
             <p:ph idx="2" type="sldImg"/>
@@ -3927,7 +3927,7 @@
   <p:cSld>
     <p:spTree>
       <p:nvGrpSpPr>
-        <p:cNvPr id="341" name="Shape 341"/>
+        <p:cNvPr id="343" name="Shape 343"/>
         <p:cNvGrpSpPr/>
         <p:nvPr/>
       </p:nvGrpSpPr>
@@ -3941,7 +3941,7 @@
       </p:grpSpPr>
       <p:sp>
         <p:nvSpPr>
-          <p:cNvPr id="342" name="Google Shape;342;ge2f4db1192_0_131:notes"/>
+          <p:cNvPr id="344" name="Google Shape;344;ge2f4db1192_0_131:notes"/>
           <p:cNvSpPr txBox="1"/>
           <p:nvPr>
             <p:ph idx="1" type="body"/>
@@ -3988,7 +3988,7 @@
       </p:sp>
       <p:sp>
         <p:nvSpPr>
-          <p:cNvPr id="343" name="Google Shape;343;ge2f4db1192_0_131:notes"/>
+          <p:cNvPr id="345" name="Google Shape;345;ge2f4db1192_0_131:notes"/>
           <p:cNvSpPr/>
           <p:nvPr>
             <p:ph idx="2" type="sldImg"/>
@@ -4044,7 +4044,7 @@
   <p:cSld>
     <p:spTree>
       <p:nvGrpSpPr>
-        <p:cNvPr id="348" name="Shape 348"/>
+        <p:cNvPr id="350" name="Shape 350"/>
         <p:cNvGrpSpPr/>
         <p:nvPr/>
       </p:nvGrpSpPr>
@@ -4058,7 +4058,7 @@
       </p:grpSpPr>
       <p:sp>
         <p:nvSpPr>
-          <p:cNvPr id="349" name="Google Shape;349;ge2f4db1192_0_142:notes"/>
+          <p:cNvPr id="351" name="Google Shape;351;ge2f4db1192_0_142:notes"/>
           <p:cNvSpPr txBox="1"/>
           <p:nvPr>
             <p:ph idx="1" type="body"/>
@@ -4105,7 +4105,7 @@
       </p:sp>
       <p:sp>
         <p:nvSpPr>
-          <p:cNvPr id="350" name="Google Shape;350;ge2f4db1192_0_142:notes"/>
+          <p:cNvPr id="352" name="Google Shape;352;ge2f4db1192_0_142:notes"/>
           <p:cNvSpPr/>
           <p:nvPr>
             <p:ph idx="2" type="sldImg"/>
@@ -4161,7 +4161,7 @@
   <p:cSld>
     <p:spTree>
       <p:nvGrpSpPr>
-        <p:cNvPr id="354" name="Shape 354"/>
+        <p:cNvPr id="356" name="Shape 356"/>
         <p:cNvGrpSpPr/>
         <p:nvPr/>
       </p:nvGrpSpPr>
@@ -4175,7 +4175,7 @@
       </p:grpSpPr>
       <p:sp>
         <p:nvSpPr>
-          <p:cNvPr id="355" name="Google Shape;355;ge2f4db1192_0_139:notes"/>
+          <p:cNvPr id="357" name="Google Shape;357;ge2f4db1192_0_139:notes"/>
           <p:cNvSpPr txBox="1"/>
           <p:nvPr>
             <p:ph idx="1" type="body"/>
@@ -4222,7 +4222,7 @@
       </p:sp>
       <p:sp>
         <p:nvSpPr>
-          <p:cNvPr id="356" name="Google Shape;356;ge2f4db1192_0_139:notes"/>
+          <p:cNvPr id="358" name="Google Shape;358;ge2f4db1192_0_139:notes"/>
           <p:cNvSpPr/>
           <p:nvPr>
             <p:ph idx="2" type="sldImg"/>
@@ -4278,7 +4278,7 @@
   <p:cSld>
     <p:spTree>
       <p:nvGrpSpPr>
-        <p:cNvPr id="361" name="Shape 361"/>
+        <p:cNvPr id="363" name="Shape 363"/>
         <p:cNvGrpSpPr/>
         <p:nvPr/>
       </p:nvGrpSpPr>
@@ -4292,7 +4292,7 @@
       </p:grpSpPr>
       <p:sp>
         <p:nvSpPr>
-          <p:cNvPr id="362" name="Google Shape;362;ge2f4db1192_0_136:notes"/>
+          <p:cNvPr id="364" name="Google Shape;364;ge2f4db1192_0_136:notes"/>
           <p:cNvSpPr txBox="1"/>
           <p:nvPr>
             <p:ph idx="1" type="body"/>
@@ -4339,7 +4339,7 @@
       </p:sp>
       <p:sp>
         <p:nvSpPr>
-          <p:cNvPr id="363" name="Google Shape;363;ge2f4db1192_0_136:notes"/>
+          <p:cNvPr id="365" name="Google Shape;365;ge2f4db1192_0_136:notes"/>
           <p:cNvSpPr/>
           <p:nvPr>
             <p:ph idx="2" type="sldImg"/>
@@ -4395,7 +4395,7 @@
   <p:cSld>
     <p:spTree>
       <p:nvGrpSpPr>
-        <p:cNvPr id="367" name="Shape 367"/>
+        <p:cNvPr id="369" name="Shape 369"/>
         <p:cNvGrpSpPr/>
         <p:nvPr/>
       </p:nvGrpSpPr>
@@ -4409,7 +4409,7 @@
       </p:grpSpPr>
       <p:sp>
         <p:nvSpPr>
-          <p:cNvPr id="368" name="Google Shape;368;ge2f4db1192_0_153:notes"/>
+          <p:cNvPr id="370" name="Google Shape;370;ge2f4db1192_0_153:notes"/>
           <p:cNvSpPr txBox="1"/>
           <p:nvPr>
             <p:ph idx="1" type="body"/>
@@ -4456,7 +4456,7 @@
       </p:sp>
       <p:sp>
         <p:nvSpPr>
-          <p:cNvPr id="369" name="Google Shape;369;ge2f4db1192_0_153:notes"/>
+          <p:cNvPr id="371" name="Google Shape;371;ge2f4db1192_0_153:notes"/>
           <p:cNvSpPr/>
           <p:nvPr>
             <p:ph idx="2" type="sldImg"/>
@@ -4512,7 +4512,7 @@
   <p:cSld>
     <p:spTree>
       <p:nvGrpSpPr>
-        <p:cNvPr id="374" name="Shape 374"/>
+        <p:cNvPr id="376" name="Shape 376"/>
         <p:cNvGrpSpPr/>
         <p:nvPr/>
       </p:nvGrpSpPr>
@@ -4526,7 +4526,7 @@
       </p:grpSpPr>
       <p:sp>
         <p:nvSpPr>
-          <p:cNvPr id="375" name="Google Shape;375;ge2f4db1192_0_167:notes"/>
+          <p:cNvPr id="377" name="Google Shape;377;ge2f4db1192_0_167:notes"/>
           <p:cNvSpPr txBox="1"/>
           <p:nvPr>
             <p:ph idx="1" type="body"/>
@@ -4573,7 +4573,7 @@
       </p:sp>
       <p:sp>
         <p:nvSpPr>
-          <p:cNvPr id="376" name="Google Shape;376;ge2f4db1192_0_167:notes"/>
+          <p:cNvPr id="378" name="Google Shape;378;ge2f4db1192_0_167:notes"/>
           <p:cNvSpPr/>
           <p:nvPr>
             <p:ph idx="2" type="sldImg"/>
@@ -4629,7 +4629,7 @@
   <p:cSld>
     <p:spTree>
       <p:nvGrpSpPr>
-        <p:cNvPr id="381" name="Shape 381"/>
+        <p:cNvPr id="383" name="Shape 383"/>
         <p:cNvGrpSpPr/>
         <p:nvPr/>
       </p:nvGrpSpPr>
@@ -4643,7 +4643,7 @@
       </p:grpSpPr>
       <p:sp>
         <p:nvSpPr>
-          <p:cNvPr id="382" name="Google Shape;382;ge2f4db1192_0_158:notes"/>
+          <p:cNvPr id="384" name="Google Shape;384;ge2f4db1192_0_158:notes"/>
           <p:cNvSpPr txBox="1"/>
           <p:nvPr>
             <p:ph idx="1" type="body"/>
@@ -4690,7 +4690,7 @@
       </p:sp>
       <p:sp>
         <p:nvSpPr>
-          <p:cNvPr id="383" name="Google Shape;383;ge2f4db1192_0_158:notes"/>
+          <p:cNvPr id="385" name="Google Shape;385;ge2f4db1192_0_158:notes"/>
           <p:cNvSpPr/>
           <p:nvPr>
             <p:ph idx="2" type="sldImg"/>
@@ -4863,7 +4863,7 @@
   <p:cSld>
     <p:spTree>
       <p:nvGrpSpPr>
-        <p:cNvPr id="388" name="Shape 388"/>
+        <p:cNvPr id="390" name="Shape 390"/>
         <p:cNvGrpSpPr/>
         <p:nvPr/>
       </p:nvGrpSpPr>
@@ -4877,7 +4877,7 @@
       </p:grpSpPr>
       <p:sp>
         <p:nvSpPr>
-          <p:cNvPr id="389" name="Google Shape;389;ge2f4db1192_0_164:notes"/>
+          <p:cNvPr id="391" name="Google Shape;391;ge2f4db1192_0_164:notes"/>
           <p:cNvSpPr txBox="1"/>
           <p:nvPr>
             <p:ph idx="1" type="body"/>
@@ -4924,7 +4924,7 @@
       </p:sp>
       <p:sp>
         <p:nvSpPr>
-          <p:cNvPr id="390" name="Google Shape;390;ge2f4db1192_0_164:notes"/>
+          <p:cNvPr id="392" name="Google Shape;392;ge2f4db1192_0_164:notes"/>
           <p:cNvSpPr/>
           <p:nvPr>
             <p:ph idx="2" type="sldImg"/>
@@ -4980,7 +4980,7 @@
   <p:cSld>
     <p:spTree>
       <p:nvGrpSpPr>
-        <p:cNvPr id="394" name="Shape 394"/>
+        <p:cNvPr id="396" name="Shape 396"/>
         <p:cNvGrpSpPr/>
         <p:nvPr/>
       </p:nvGrpSpPr>
@@ -4994,7 +4994,7 @@
       </p:grpSpPr>
       <p:sp>
         <p:nvSpPr>
-          <p:cNvPr id="395" name="Google Shape;395;ge2f4db1192_0_161:notes"/>
+          <p:cNvPr id="397" name="Google Shape;397;ge2f4db1192_0_161:notes"/>
           <p:cNvSpPr txBox="1"/>
           <p:nvPr>
             <p:ph idx="1" type="body"/>
@@ -5041,7 +5041,7 @@
       </p:sp>
       <p:sp>
         <p:nvSpPr>
-          <p:cNvPr id="396" name="Google Shape;396;ge2f4db1192_0_161:notes"/>
+          <p:cNvPr id="398" name="Google Shape;398;ge2f4db1192_0_161:notes"/>
           <p:cNvSpPr/>
           <p:nvPr>
             <p:ph idx="2" type="sldImg"/>
@@ -5097,7 +5097,7 @@
   <p:cSld>
     <p:spTree>
       <p:nvGrpSpPr>
-        <p:cNvPr id="400" name="Shape 400"/>
+        <p:cNvPr id="402" name="Shape 402"/>
         <p:cNvGrpSpPr/>
         <p:nvPr/>
       </p:nvGrpSpPr>
@@ -5111,7 +5111,7 @@
       </p:grpSpPr>
       <p:sp>
         <p:nvSpPr>
-          <p:cNvPr id="401" name="Google Shape;401;gf0bfaaec38_0_142:notes"/>
+          <p:cNvPr id="403" name="Google Shape;403;gf0bfaaec38_0_142:notes"/>
           <p:cNvSpPr txBox="1"/>
           <p:nvPr>
             <p:ph idx="1" type="body"/>
@@ -5158,7 +5158,7 @@
       </p:sp>
       <p:sp>
         <p:nvSpPr>
-          <p:cNvPr id="402" name="Google Shape;402;gf0bfaaec38_0_142:notes"/>
+          <p:cNvPr id="404" name="Google Shape;404;gf0bfaaec38_0_142:notes"/>
           <p:cNvSpPr/>
           <p:nvPr>
             <p:ph idx="2" type="sldImg"/>
@@ -5214,7 +5214,7 @@
   <p:cSld>
     <p:spTree>
       <p:nvGrpSpPr>
-        <p:cNvPr id="405" name="Shape 405"/>
+        <p:cNvPr id="407" name="Shape 407"/>
         <p:cNvGrpSpPr/>
         <p:nvPr/>
       </p:nvGrpSpPr>
@@ -5228,7 +5228,7 @@
       </p:grpSpPr>
       <p:sp>
         <p:nvSpPr>
-          <p:cNvPr id="406" name="Google Shape;406;gf0bfaaec38_0_0:notes"/>
+          <p:cNvPr id="408" name="Google Shape;408;gf0bfaaec38_0_0:notes"/>
           <p:cNvSpPr txBox="1"/>
           <p:nvPr>
             <p:ph idx="1" type="body"/>
@@ -5275,7 +5275,7 @@
       </p:sp>
       <p:sp>
         <p:nvSpPr>
-          <p:cNvPr id="407" name="Google Shape;407;gf0bfaaec38_0_0:notes"/>
+          <p:cNvPr id="409" name="Google Shape;409;gf0bfaaec38_0_0:notes"/>
           <p:cNvSpPr/>
           <p:nvPr>
             <p:ph idx="2" type="sldImg"/>
@@ -5331,7 +5331,7 @@
   <p:cSld>
     <p:spTree>
       <p:nvGrpSpPr>
-        <p:cNvPr id="413" name="Shape 413"/>
+        <p:cNvPr id="415" name="Shape 415"/>
         <p:cNvGrpSpPr/>
         <p:nvPr/>
       </p:nvGrpSpPr>
@@ -5345,7 +5345,7 @@
       </p:grpSpPr>
       <p:sp>
         <p:nvSpPr>
-          <p:cNvPr id="414" name="Google Shape;414;gd400e85af4_0_5:notes"/>
+          <p:cNvPr id="416" name="Google Shape;416;gd400e85af4_0_5:notes"/>
           <p:cNvSpPr txBox="1"/>
           <p:nvPr>
             <p:ph idx="1" type="body"/>
@@ -5384,7 +5384,7 @@
       </p:sp>
       <p:sp>
         <p:nvSpPr>
-          <p:cNvPr id="415" name="Google Shape;415;gd400e85af4_0_5:notes"/>
+          <p:cNvPr id="417" name="Google Shape;417;gd400e85af4_0_5:notes"/>
           <p:cNvSpPr/>
           <p:nvPr>
             <p:ph idx="2" type="sldImg"/>
@@ -21148,36 +21148,9 @@
           <a:chExt cx="0" cy="0"/>
         </a:xfrm>
       </p:grpSpPr>
-      <p:pic>
-        <p:nvPicPr>
-          <p:cNvPr id="205" name="Google Shape;205;p25"/>
-          <p:cNvPicPr preferRelativeResize="0"/>
-          <p:nvPr/>
-        </p:nvPicPr>
-        <p:blipFill rotWithShape="1">
-          <a:blip r:embed="rId4">
-            <a:alphaModFix/>
-          </a:blip>
-          <a:srcRect b="0" l="0" r="0" t="0"/>
-          <a:stretch/>
-        </p:blipFill>
-        <p:spPr>
-          <a:xfrm>
-            <a:off x="632200" y="1110126"/>
-            <a:ext cx="4932074" cy="3769450"/>
-          </a:xfrm>
-          <a:prstGeom prst="rect">
-            <a:avLst/>
-          </a:prstGeom>
-          <a:noFill/>
-          <a:ln>
-            <a:noFill/>
-          </a:ln>
-        </p:spPr>
-      </p:pic>
       <p:sp>
         <p:nvSpPr>
-          <p:cNvPr id="206" name="Google Shape;206;p25"/>
+          <p:cNvPr id="205" name="Google Shape;205;p25"/>
           <p:cNvSpPr txBox="1"/>
           <p:nvPr/>
         </p:nvSpPr>
@@ -21245,7 +21218,7 @@
       </p:sp>
       <p:sp>
         <p:nvSpPr>
-          <p:cNvPr id="207" name="Google Shape;207;p25"/>
+          <p:cNvPr id="206" name="Google Shape;206;p25"/>
           <p:cNvSpPr txBox="1"/>
           <p:nvPr/>
         </p:nvSpPr>
@@ -21323,6 +21296,77 @@
           </a:p>
         </p:txBody>
       </p:sp>
+      <p:grpSp>
+        <p:nvGrpSpPr>
+          <p:cNvPr id="207" name="Google Shape;207;p25"/>
+          <p:cNvGrpSpPr/>
+          <p:nvPr/>
+        </p:nvGrpSpPr>
+        <p:grpSpPr>
+          <a:xfrm>
+            <a:off x="632200" y="1110126"/>
+            <a:ext cx="4932074" cy="3769449"/>
+            <a:chOff x="632200" y="1110126"/>
+            <a:chExt cx="4932074" cy="3769449"/>
+          </a:xfrm>
+        </p:grpSpPr>
+        <p:pic>
+          <p:nvPicPr>
+            <p:cNvPr id="208" name="Google Shape;208;p25"/>
+            <p:cNvPicPr preferRelativeResize="0"/>
+            <p:nvPr/>
+          </p:nvPicPr>
+          <p:blipFill>
+            <a:blip r:embed="rId4">
+              <a:alphaModFix/>
+            </a:blip>
+            <a:stretch>
+              <a:fillRect/>
+            </a:stretch>
+          </p:blipFill>
+          <p:spPr>
+            <a:xfrm>
+              <a:off x="632200" y="1110126"/>
+              <a:ext cx="4932074" cy="3769449"/>
+            </a:xfrm>
+            <a:prstGeom prst="rect">
+              <a:avLst/>
+            </a:prstGeom>
+            <a:noFill/>
+            <a:ln>
+              <a:noFill/>
+            </a:ln>
+          </p:spPr>
+        </p:pic>
+        <p:pic>
+          <p:nvPicPr>
+            <p:cNvPr id="209" name="Google Shape;209;p25"/>
+            <p:cNvPicPr preferRelativeResize="0"/>
+            <p:nvPr/>
+          </p:nvPicPr>
+          <p:blipFill>
+            <a:blip r:embed="rId5">
+              <a:alphaModFix/>
+            </a:blip>
+            <a:stretch>
+              <a:fillRect/>
+            </a:stretch>
+          </p:blipFill>
+          <p:spPr>
+            <a:xfrm>
+              <a:off x="2357450" y="2790000"/>
+              <a:ext cx="174300" cy="151075"/>
+            </a:xfrm>
+            <a:prstGeom prst="rect">
+              <a:avLst/>
+            </a:prstGeom>
+            <a:noFill/>
+            <a:ln>
+              <a:noFill/>
+            </a:ln>
+          </p:spPr>
+        </p:pic>
+      </p:grpSp>
     </p:spTree>
   </p:cSld>
   <p:clrMapOvr>
@@ -21348,7 +21392,7 @@
     </p:bg>
     <p:spTree>
       <p:nvGrpSpPr>
-        <p:cNvPr id="211" name="Shape 211"/>
+        <p:cNvPr id="213" name="Shape 213"/>
         <p:cNvGrpSpPr/>
         <p:nvPr/>
       </p:nvGrpSpPr>
@@ -21362,7 +21406,7 @@
       </p:grpSpPr>
       <p:sp>
         <p:nvSpPr>
-          <p:cNvPr id="212" name="Google Shape;212;p26"/>
+          <p:cNvPr id="214" name="Google Shape;214;p26"/>
           <p:cNvSpPr txBox="1"/>
           <p:nvPr/>
         </p:nvSpPr>
@@ -21415,7 +21459,7 @@
       </p:sp>
       <p:sp>
         <p:nvSpPr>
-          <p:cNvPr id="213" name="Google Shape;213;p26"/>
+          <p:cNvPr id="215" name="Google Shape;215;p26"/>
           <p:cNvSpPr txBox="1"/>
           <p:nvPr/>
         </p:nvSpPr>
@@ -21653,7 +21697,7 @@
                 <a:cs typeface="Consolas"/>
                 <a:sym typeface="Consolas"/>
               </a:rPr>
-              <a:t>	teléfono text</a:t>
+              <a:t>	telefono text</a:t>
             </a:r>
             <a:endParaRPr sz="1100">
               <a:solidFill>
@@ -21893,7 +21937,7 @@
     </p:bg>
     <p:spTree>
       <p:nvGrpSpPr>
-        <p:cNvPr id="217" name="Shape 217"/>
+        <p:cNvPr id="219" name="Shape 219"/>
         <p:cNvGrpSpPr/>
         <p:nvPr/>
       </p:nvGrpSpPr>
@@ -21907,7 +21951,7 @@
       </p:grpSpPr>
       <p:sp>
         <p:nvSpPr>
-          <p:cNvPr id="218" name="Google Shape;218;p27"/>
+          <p:cNvPr id="220" name="Google Shape;220;p27"/>
           <p:cNvSpPr txBox="1"/>
           <p:nvPr/>
         </p:nvSpPr>
@@ -21960,7 +22004,7 @@
       </p:sp>
       <p:sp>
         <p:nvSpPr>
-          <p:cNvPr id="219" name="Google Shape;219;p27"/>
+          <p:cNvPr id="221" name="Google Shape;221;p27"/>
           <p:cNvSpPr txBox="1"/>
           <p:nvPr/>
         </p:nvSpPr>
@@ -22446,7 +22490,7 @@
     </p:bg>
     <p:spTree>
       <p:nvGrpSpPr>
-        <p:cNvPr id="223" name="Shape 223"/>
+        <p:cNvPr id="225" name="Shape 225"/>
         <p:cNvGrpSpPr/>
         <p:nvPr/>
       </p:nvGrpSpPr>
@@ -22460,7 +22504,7 @@
       </p:grpSpPr>
       <p:sp>
         <p:nvSpPr>
-          <p:cNvPr id="224" name="Google Shape;224;p28"/>
+          <p:cNvPr id="226" name="Google Shape;226;p28"/>
           <p:cNvSpPr txBox="1"/>
           <p:nvPr/>
         </p:nvSpPr>
@@ -22513,7 +22557,7 @@
       </p:sp>
       <p:sp>
         <p:nvSpPr>
-          <p:cNvPr id="225" name="Google Shape;225;p28"/>
+          <p:cNvPr id="227" name="Google Shape;227;p28"/>
           <p:cNvSpPr txBox="1"/>
           <p:nvPr/>
         </p:nvSpPr>
@@ -22826,7 +22870,7 @@
       </p:sp>
       <p:sp>
         <p:nvSpPr>
-          <p:cNvPr id="226" name="Google Shape;226;p28"/>
+          <p:cNvPr id="228" name="Google Shape;228;p28"/>
           <p:cNvSpPr txBox="1"/>
           <p:nvPr/>
         </p:nvSpPr>
@@ -22910,7 +22954,7 @@
     </p:bg>
     <p:spTree>
       <p:nvGrpSpPr>
-        <p:cNvPr id="230" name="Shape 230"/>
+        <p:cNvPr id="232" name="Shape 232"/>
         <p:cNvGrpSpPr/>
         <p:nvPr/>
       </p:nvGrpSpPr>
@@ -22924,7 +22968,7 @@
       </p:grpSpPr>
       <p:sp>
         <p:nvSpPr>
-          <p:cNvPr id="231" name="Google Shape;231;p29"/>
+          <p:cNvPr id="233" name="Google Shape;233;p29"/>
           <p:cNvSpPr txBox="1"/>
           <p:nvPr/>
         </p:nvSpPr>
@@ -22977,7 +23021,7 @@
       </p:sp>
       <p:sp>
         <p:nvSpPr>
-          <p:cNvPr id="232" name="Google Shape;232;p29"/>
+          <p:cNvPr id="234" name="Google Shape;234;p29"/>
           <p:cNvSpPr txBox="1"/>
           <p:nvPr/>
         </p:nvSpPr>
@@ -23075,7 +23119,7 @@
                 <a:cs typeface="Consolas"/>
                 <a:sym typeface="Consolas"/>
               </a:rPr>
-              <a:t>insert into Clientes (id, nombre, apellidos, telefono)</a:t>
+              <a:t>insert into Cliente (id, nombre, apellidos, telefono)</a:t>
             </a:r>
             <a:endParaRPr sz="1300">
               <a:solidFill>
@@ -23110,7 +23154,55 @@
                 <a:cs typeface="Consolas"/>
                 <a:sym typeface="Consolas"/>
               </a:rPr>
-              <a:t>  values(‘109899’, ‘Juan’, ‘Pérez Gómez’, 3023345664);</a:t>
+              <a:t>  values(</a:t>
+            </a:r>
+            <a:r>
+              <a:rPr lang="es" sz="1300">
+                <a:solidFill>
+                  <a:srgbClr val="375FA9"/>
+                </a:solidFill>
+                <a:latin typeface="Consolas"/>
+                <a:ea typeface="Consolas"/>
+                <a:cs typeface="Consolas"/>
+                <a:sym typeface="Consolas"/>
+              </a:rPr>
+              <a:t>'</a:t>
+            </a:r>
+            <a:r>
+              <a:rPr lang="es" sz="1300">
+                <a:solidFill>
+                  <a:srgbClr val="375FA9"/>
+                </a:solidFill>
+                <a:latin typeface="Consolas"/>
+                <a:ea typeface="Consolas"/>
+                <a:cs typeface="Consolas"/>
+                <a:sym typeface="Consolas"/>
+              </a:rPr>
+              <a:t>109899</a:t>
+            </a:r>
+            <a:r>
+              <a:rPr lang="es" sz="1300">
+                <a:solidFill>
+                  <a:srgbClr val="375FA9"/>
+                </a:solidFill>
+                <a:latin typeface="Consolas"/>
+                <a:ea typeface="Consolas"/>
+                <a:cs typeface="Consolas"/>
+                <a:sym typeface="Consolas"/>
+              </a:rPr>
+              <a:t>'</a:t>
+            </a:r>
+            <a:r>
+              <a:rPr lang="es" sz="1300">
+                <a:solidFill>
+                  <a:srgbClr val="375FA9"/>
+                </a:solidFill>
+                <a:latin typeface="Consolas"/>
+                <a:ea typeface="Consolas"/>
+                <a:cs typeface="Consolas"/>
+                <a:sym typeface="Consolas"/>
+              </a:rPr>
+              <a:t>, 'Juan', 'Pérez Gómez', 3023345664);</a:t>
             </a:r>
             <a:endParaRPr sz="1200">
               <a:solidFill>
@@ -23145,7 +23237,7 @@
                 <a:cs typeface="Consolas"/>
                 <a:sym typeface="Consolas"/>
               </a:rPr>
-              <a:t>insert into Clientes (id, nombre, apellidos, telefono)</a:t>
+              <a:t>insert into Cliente (id, nombre, apellidos, telefono)</a:t>
             </a:r>
             <a:endParaRPr sz="1200">
               <a:solidFill>
@@ -23180,7 +23272,7 @@
                 <a:cs typeface="Consolas"/>
                 <a:sym typeface="Consolas"/>
               </a:rPr>
-              <a:t>  values(‘104695’, ‘José’, ‘López Ariza’, 3123675774);</a:t>
+              <a:t>  values('104695', 'José', 'López Ariza', 3123675774);</a:t>
             </a:r>
             <a:endParaRPr sz="1200">
               <a:solidFill>
@@ -23276,7 +23368,7 @@
                 <a:cs typeface="Consolas"/>
                 <a:sym typeface="Consolas"/>
               </a:rPr>
-              <a:t>  values(1, ‘Tarjeta de crédito’);</a:t>
+              <a:t>  values(1, 'Tarjeta de crédito');</a:t>
             </a:r>
             <a:endParaRPr sz="1200">
               <a:solidFill>
@@ -23346,7 +23438,7 @@
                 <a:cs typeface="Consolas"/>
                 <a:sym typeface="Consolas"/>
               </a:rPr>
-              <a:t>  values(2, ‘Tarjeta dédito’);</a:t>
+              <a:t>  values(2, 'Tarjeta dédito');</a:t>
             </a:r>
             <a:endParaRPr sz="1200">
               <a:solidFill>
@@ -23416,7 +23508,7 @@
                 <a:cs typeface="Consolas"/>
                 <a:sym typeface="Consolas"/>
               </a:rPr>
-              <a:t>  values(3, ‘Efectivo’);</a:t>
+              <a:t>  values(3, 'Efectivo');</a:t>
             </a:r>
             <a:endParaRPr sz="1200">
               <a:solidFill>
@@ -23499,7 +23591,7 @@
     </p:bg>
     <p:spTree>
       <p:nvGrpSpPr>
-        <p:cNvPr id="236" name="Shape 236"/>
+        <p:cNvPr id="238" name="Shape 238"/>
         <p:cNvGrpSpPr/>
         <p:nvPr/>
       </p:nvGrpSpPr>
@@ -23513,7 +23605,7 @@
       </p:grpSpPr>
       <p:sp>
         <p:nvSpPr>
-          <p:cNvPr id="237" name="Google Shape;237;p30"/>
+          <p:cNvPr id="239" name="Google Shape;239;p30"/>
           <p:cNvSpPr txBox="1"/>
           <p:nvPr/>
         </p:nvSpPr>
@@ -23566,7 +23658,7 @@
       </p:sp>
       <p:sp>
         <p:nvSpPr>
-          <p:cNvPr id="238" name="Google Shape;238;p30"/>
+          <p:cNvPr id="240" name="Google Shape;240;p30"/>
           <p:cNvSpPr txBox="1"/>
           <p:nvPr/>
         </p:nvSpPr>
@@ -23699,7 +23791,103 @@
                 <a:cs typeface="Consolas"/>
                 <a:sym typeface="Consolas"/>
               </a:rPr>
-              <a:t>  values(‘99’, ‘Mouse’, 25000, 64);</a:t>
+              <a:t>  values(</a:t>
+            </a:r>
+            <a:r>
+              <a:rPr lang="es" sz="1300">
+                <a:solidFill>
+                  <a:srgbClr val="375FA9"/>
+                </a:solidFill>
+                <a:latin typeface="Consolas"/>
+                <a:ea typeface="Consolas"/>
+                <a:cs typeface="Consolas"/>
+                <a:sym typeface="Consolas"/>
+              </a:rPr>
+              <a:t>'</a:t>
+            </a:r>
+            <a:r>
+              <a:rPr lang="es" sz="1100">
+                <a:solidFill>
+                  <a:srgbClr val="375FA9"/>
+                </a:solidFill>
+                <a:latin typeface="Consolas"/>
+                <a:ea typeface="Consolas"/>
+                <a:cs typeface="Consolas"/>
+                <a:sym typeface="Consolas"/>
+              </a:rPr>
+              <a:t>99</a:t>
+            </a:r>
+            <a:r>
+              <a:rPr lang="es" sz="1300">
+                <a:solidFill>
+                  <a:srgbClr val="375FA9"/>
+                </a:solidFill>
+                <a:latin typeface="Consolas"/>
+                <a:ea typeface="Consolas"/>
+                <a:cs typeface="Consolas"/>
+                <a:sym typeface="Consolas"/>
+              </a:rPr>
+              <a:t>'</a:t>
+            </a:r>
+            <a:r>
+              <a:rPr lang="es" sz="1100">
+                <a:solidFill>
+                  <a:srgbClr val="375FA9"/>
+                </a:solidFill>
+                <a:latin typeface="Consolas"/>
+                <a:ea typeface="Consolas"/>
+                <a:cs typeface="Consolas"/>
+                <a:sym typeface="Consolas"/>
+              </a:rPr>
+              <a:t>, </a:t>
+            </a:r>
+            <a:r>
+              <a:rPr lang="es" sz="1300">
+                <a:solidFill>
+                  <a:srgbClr val="375FA9"/>
+                </a:solidFill>
+                <a:latin typeface="Consolas"/>
+                <a:ea typeface="Consolas"/>
+                <a:cs typeface="Consolas"/>
+                <a:sym typeface="Consolas"/>
+              </a:rPr>
+              <a:t>'</a:t>
+            </a:r>
+            <a:r>
+              <a:rPr lang="es" sz="1100">
+                <a:solidFill>
+                  <a:srgbClr val="375FA9"/>
+                </a:solidFill>
+                <a:latin typeface="Consolas"/>
+                <a:ea typeface="Consolas"/>
+                <a:cs typeface="Consolas"/>
+                <a:sym typeface="Consolas"/>
+              </a:rPr>
+              <a:t>Mouse</a:t>
+            </a:r>
+            <a:r>
+              <a:rPr lang="es" sz="1300">
+                <a:solidFill>
+                  <a:srgbClr val="375FA9"/>
+                </a:solidFill>
+                <a:latin typeface="Consolas"/>
+                <a:ea typeface="Consolas"/>
+                <a:cs typeface="Consolas"/>
+                <a:sym typeface="Consolas"/>
+              </a:rPr>
+              <a:t>'</a:t>
+            </a:r>
+            <a:r>
+              <a:rPr lang="es" sz="1100">
+                <a:solidFill>
+                  <a:srgbClr val="375FA9"/>
+                </a:solidFill>
+                <a:latin typeface="Consolas"/>
+                <a:ea typeface="Consolas"/>
+                <a:cs typeface="Consolas"/>
+                <a:sym typeface="Consolas"/>
+              </a:rPr>
+              <a:t>, 25000, 64);</a:t>
             </a:r>
             <a:endParaRPr sz="1000">
               <a:solidFill>
@@ -23734,7 +23922,31 @@
                 <a:cs typeface="Consolas"/>
                 <a:sym typeface="Consolas"/>
               </a:rPr>
-              <a:t>insert into Clientes (id, nombre, precio, existencia)</a:t>
+              <a:t>insert into </a:t>
+            </a:r>
+            <a:r>
+              <a:rPr lang="es" sz="1100">
+                <a:solidFill>
+                  <a:srgbClr val="375FA9"/>
+                </a:solidFill>
+                <a:latin typeface="Consolas"/>
+                <a:ea typeface="Consolas"/>
+                <a:cs typeface="Consolas"/>
+                <a:sym typeface="Consolas"/>
+              </a:rPr>
+              <a:t>Producto</a:t>
+            </a:r>
+            <a:r>
+              <a:rPr lang="es" sz="1100">
+                <a:solidFill>
+                  <a:srgbClr val="375FA9"/>
+                </a:solidFill>
+                <a:latin typeface="Consolas"/>
+                <a:ea typeface="Consolas"/>
+                <a:cs typeface="Consolas"/>
+                <a:sym typeface="Consolas"/>
+              </a:rPr>
+              <a:t> (id, nombre, precio, existencia)</a:t>
             </a:r>
             <a:endParaRPr sz="1100">
               <a:solidFill>
@@ -23769,7 +23981,151 @@
                 <a:cs typeface="Consolas"/>
                 <a:sym typeface="Consolas"/>
               </a:rPr>
-              <a:t>  values(‘104’, ‘Teclado’, ‘48000’, 77);</a:t>
+              <a:t>  values(</a:t>
+            </a:r>
+            <a:r>
+              <a:rPr lang="es" sz="1300">
+                <a:solidFill>
+                  <a:srgbClr val="375FA9"/>
+                </a:solidFill>
+                <a:latin typeface="Consolas"/>
+                <a:ea typeface="Consolas"/>
+                <a:cs typeface="Consolas"/>
+                <a:sym typeface="Consolas"/>
+              </a:rPr>
+              <a:t>'</a:t>
+            </a:r>
+            <a:r>
+              <a:rPr lang="es" sz="1100">
+                <a:solidFill>
+                  <a:srgbClr val="375FA9"/>
+                </a:solidFill>
+                <a:latin typeface="Consolas"/>
+                <a:ea typeface="Consolas"/>
+                <a:cs typeface="Consolas"/>
+                <a:sym typeface="Consolas"/>
+              </a:rPr>
+              <a:t>104</a:t>
+            </a:r>
+            <a:r>
+              <a:rPr lang="es" sz="1300">
+                <a:solidFill>
+                  <a:srgbClr val="375FA9"/>
+                </a:solidFill>
+                <a:latin typeface="Consolas"/>
+                <a:ea typeface="Consolas"/>
+                <a:cs typeface="Consolas"/>
+                <a:sym typeface="Consolas"/>
+              </a:rPr>
+              <a:t>'</a:t>
+            </a:r>
+            <a:r>
+              <a:rPr lang="es" sz="1100">
+                <a:solidFill>
+                  <a:srgbClr val="375FA9"/>
+                </a:solidFill>
+                <a:latin typeface="Consolas"/>
+                <a:ea typeface="Consolas"/>
+                <a:cs typeface="Consolas"/>
+                <a:sym typeface="Consolas"/>
+              </a:rPr>
+              <a:t>, </a:t>
+            </a:r>
+            <a:r>
+              <a:rPr lang="es" sz="1300">
+                <a:solidFill>
+                  <a:srgbClr val="375FA9"/>
+                </a:solidFill>
+                <a:latin typeface="Consolas"/>
+                <a:ea typeface="Consolas"/>
+                <a:cs typeface="Consolas"/>
+                <a:sym typeface="Consolas"/>
+              </a:rPr>
+              <a:t>'</a:t>
+            </a:r>
+            <a:r>
+              <a:rPr lang="es" sz="1100">
+                <a:solidFill>
+                  <a:srgbClr val="375FA9"/>
+                </a:solidFill>
+                <a:latin typeface="Consolas"/>
+                <a:ea typeface="Consolas"/>
+                <a:cs typeface="Consolas"/>
+                <a:sym typeface="Consolas"/>
+              </a:rPr>
+              <a:t>Teclado</a:t>
+            </a:r>
+            <a:r>
+              <a:rPr lang="es" sz="1300">
+                <a:solidFill>
+                  <a:srgbClr val="375FA9"/>
+                </a:solidFill>
+                <a:latin typeface="Consolas"/>
+                <a:ea typeface="Consolas"/>
+                <a:cs typeface="Consolas"/>
+                <a:sym typeface="Consolas"/>
+              </a:rPr>
+              <a:t>'</a:t>
+            </a:r>
+            <a:r>
+              <a:rPr lang="es" sz="1100">
+                <a:solidFill>
+                  <a:srgbClr val="375FA9"/>
+                </a:solidFill>
+                <a:latin typeface="Consolas"/>
+                <a:ea typeface="Consolas"/>
+                <a:cs typeface="Consolas"/>
+                <a:sym typeface="Consolas"/>
+              </a:rPr>
+              <a:t>, </a:t>
+            </a:r>
+            <a:r>
+              <a:rPr lang="es" sz="1300">
+                <a:solidFill>
+                  <a:srgbClr val="375FA9"/>
+                </a:solidFill>
+                <a:latin typeface="Consolas"/>
+                <a:ea typeface="Consolas"/>
+                <a:cs typeface="Consolas"/>
+                <a:sym typeface="Consolas"/>
+              </a:rPr>
+              <a:t>'</a:t>
+            </a:r>
+            <a:r>
+              <a:rPr lang="es" sz="1100">
+                <a:solidFill>
+                  <a:srgbClr val="375FA9"/>
+                </a:solidFill>
+                <a:latin typeface="Consolas"/>
+                <a:ea typeface="Consolas"/>
+                <a:cs typeface="Consolas"/>
+                <a:sym typeface="Consolas"/>
+              </a:rPr>
+              <a:t>48000</a:t>
+            </a:r>
+            <a:r>
+              <a:rPr lang="es" sz="1300">
+                <a:solidFill>
+                  <a:srgbClr val="375FA9"/>
+                </a:solidFill>
+                <a:latin typeface="Consolas"/>
+                <a:ea typeface="Consolas"/>
+                <a:cs typeface="Consolas"/>
+                <a:sym typeface="Consolas"/>
+              </a:rPr>
+              <a:t>'</a:t>
+            </a:r>
+            <a:r>
+              <a:rPr lang="es" sz="1100">
+                <a:solidFill>
+                  <a:srgbClr val="375FA9"/>
+                </a:solidFill>
+                <a:latin typeface="Consolas"/>
+                <a:ea typeface="Consolas"/>
+                <a:cs typeface="Consolas"/>
+                <a:sym typeface="Consolas"/>
+              </a:rPr>
+              <a:t>, 77);</a:t>
             </a:r>
             <a:endParaRPr sz="1000">
               <a:solidFill>
@@ -23804,7 +24160,31 @@
                 <a:cs typeface="Consolas"/>
                 <a:sym typeface="Consolas"/>
               </a:rPr>
-              <a:t>insert into Clientes (id, nombre, precio, existencia)</a:t>
+              <a:t>insert into </a:t>
+            </a:r>
+            <a:r>
+              <a:rPr lang="es" sz="1100">
+                <a:solidFill>
+                  <a:srgbClr val="375FA9"/>
+                </a:solidFill>
+                <a:latin typeface="Consolas"/>
+                <a:ea typeface="Consolas"/>
+                <a:cs typeface="Consolas"/>
+                <a:sym typeface="Consolas"/>
+              </a:rPr>
+              <a:t>Producto</a:t>
+            </a:r>
+            <a:r>
+              <a:rPr lang="es" sz="1100">
+                <a:solidFill>
+                  <a:srgbClr val="375FA9"/>
+                </a:solidFill>
+                <a:latin typeface="Consolas"/>
+                <a:ea typeface="Consolas"/>
+                <a:cs typeface="Consolas"/>
+                <a:sym typeface="Consolas"/>
+              </a:rPr>
+              <a:t> (id, nombre, precio, existencia)</a:t>
             </a:r>
             <a:endParaRPr sz="1000">
               <a:solidFill>
@@ -23839,7 +24219,151 @@
                 <a:cs typeface="Consolas"/>
                 <a:sym typeface="Consolas"/>
               </a:rPr>
-              <a:t>  values(‘47’, ‘Monitor’, ‘368000’, 23);</a:t>
+              <a:t>  values(</a:t>
+            </a:r>
+            <a:r>
+              <a:rPr lang="es" sz="1300">
+                <a:solidFill>
+                  <a:srgbClr val="375FA9"/>
+                </a:solidFill>
+                <a:latin typeface="Consolas"/>
+                <a:ea typeface="Consolas"/>
+                <a:cs typeface="Consolas"/>
+                <a:sym typeface="Consolas"/>
+              </a:rPr>
+              <a:t>'</a:t>
+            </a:r>
+            <a:r>
+              <a:rPr lang="es" sz="1100">
+                <a:solidFill>
+                  <a:srgbClr val="375FA9"/>
+                </a:solidFill>
+                <a:latin typeface="Consolas"/>
+                <a:ea typeface="Consolas"/>
+                <a:cs typeface="Consolas"/>
+                <a:sym typeface="Consolas"/>
+              </a:rPr>
+              <a:t>47</a:t>
+            </a:r>
+            <a:r>
+              <a:rPr lang="es" sz="1300">
+                <a:solidFill>
+                  <a:srgbClr val="375FA9"/>
+                </a:solidFill>
+                <a:latin typeface="Consolas"/>
+                <a:ea typeface="Consolas"/>
+                <a:cs typeface="Consolas"/>
+                <a:sym typeface="Consolas"/>
+              </a:rPr>
+              <a:t>'</a:t>
+            </a:r>
+            <a:r>
+              <a:rPr lang="es" sz="1100">
+                <a:solidFill>
+                  <a:srgbClr val="375FA9"/>
+                </a:solidFill>
+                <a:latin typeface="Consolas"/>
+                <a:ea typeface="Consolas"/>
+                <a:cs typeface="Consolas"/>
+                <a:sym typeface="Consolas"/>
+              </a:rPr>
+              <a:t>, </a:t>
+            </a:r>
+            <a:r>
+              <a:rPr lang="es" sz="1300">
+                <a:solidFill>
+                  <a:srgbClr val="375FA9"/>
+                </a:solidFill>
+                <a:latin typeface="Consolas"/>
+                <a:ea typeface="Consolas"/>
+                <a:cs typeface="Consolas"/>
+                <a:sym typeface="Consolas"/>
+              </a:rPr>
+              <a:t>'</a:t>
+            </a:r>
+            <a:r>
+              <a:rPr lang="es" sz="1100">
+                <a:solidFill>
+                  <a:srgbClr val="375FA9"/>
+                </a:solidFill>
+                <a:latin typeface="Consolas"/>
+                <a:ea typeface="Consolas"/>
+                <a:cs typeface="Consolas"/>
+                <a:sym typeface="Consolas"/>
+              </a:rPr>
+              <a:t>Monitor</a:t>
+            </a:r>
+            <a:r>
+              <a:rPr lang="es" sz="1300">
+                <a:solidFill>
+                  <a:srgbClr val="375FA9"/>
+                </a:solidFill>
+                <a:latin typeface="Consolas"/>
+                <a:ea typeface="Consolas"/>
+                <a:cs typeface="Consolas"/>
+                <a:sym typeface="Consolas"/>
+              </a:rPr>
+              <a:t>'</a:t>
+            </a:r>
+            <a:r>
+              <a:rPr lang="es" sz="1100">
+                <a:solidFill>
+                  <a:srgbClr val="375FA9"/>
+                </a:solidFill>
+                <a:latin typeface="Consolas"/>
+                <a:ea typeface="Consolas"/>
+                <a:cs typeface="Consolas"/>
+                <a:sym typeface="Consolas"/>
+              </a:rPr>
+              <a:t>, </a:t>
+            </a:r>
+            <a:r>
+              <a:rPr lang="es" sz="1300">
+                <a:solidFill>
+                  <a:srgbClr val="375FA9"/>
+                </a:solidFill>
+                <a:latin typeface="Consolas"/>
+                <a:ea typeface="Consolas"/>
+                <a:cs typeface="Consolas"/>
+                <a:sym typeface="Consolas"/>
+              </a:rPr>
+              <a:t>'</a:t>
+            </a:r>
+            <a:r>
+              <a:rPr lang="es" sz="1100">
+                <a:solidFill>
+                  <a:srgbClr val="375FA9"/>
+                </a:solidFill>
+                <a:latin typeface="Consolas"/>
+                <a:ea typeface="Consolas"/>
+                <a:cs typeface="Consolas"/>
+                <a:sym typeface="Consolas"/>
+              </a:rPr>
+              <a:t>368000</a:t>
+            </a:r>
+            <a:r>
+              <a:rPr lang="es" sz="1300">
+                <a:solidFill>
+                  <a:srgbClr val="375FA9"/>
+                </a:solidFill>
+                <a:latin typeface="Consolas"/>
+                <a:ea typeface="Consolas"/>
+                <a:cs typeface="Consolas"/>
+                <a:sym typeface="Consolas"/>
+              </a:rPr>
+              <a:t>'</a:t>
+            </a:r>
+            <a:r>
+              <a:rPr lang="es" sz="1100">
+                <a:solidFill>
+                  <a:srgbClr val="375FA9"/>
+                </a:solidFill>
+                <a:latin typeface="Consolas"/>
+                <a:ea typeface="Consolas"/>
+                <a:cs typeface="Consolas"/>
+                <a:sym typeface="Consolas"/>
+              </a:rPr>
+              <a:t>, 23);</a:t>
             </a:r>
             <a:endParaRPr sz="1000">
               <a:solidFill>
@@ -23935,7 +24459,55 @@
                 <a:cs typeface="Consolas"/>
                 <a:sym typeface="Consolas"/>
               </a:rPr>
-              <a:t>  values(1008, 109899, ‘6/12/20’, 2);</a:t>
+              <a:t>  values(1008, 109899, </a:t>
+            </a:r>
+            <a:r>
+              <a:rPr lang="es" sz="1300">
+                <a:solidFill>
+                  <a:srgbClr val="375FA9"/>
+                </a:solidFill>
+                <a:latin typeface="Consolas"/>
+                <a:ea typeface="Consolas"/>
+                <a:cs typeface="Consolas"/>
+                <a:sym typeface="Consolas"/>
+              </a:rPr>
+              <a:t>'</a:t>
+            </a:r>
+            <a:r>
+              <a:rPr lang="es" sz="1100">
+                <a:solidFill>
+                  <a:srgbClr val="375FA9"/>
+                </a:solidFill>
+                <a:latin typeface="Consolas"/>
+                <a:ea typeface="Consolas"/>
+                <a:cs typeface="Consolas"/>
+                <a:sym typeface="Consolas"/>
+              </a:rPr>
+              <a:t>6/12/20</a:t>
+            </a:r>
+            <a:r>
+              <a:rPr lang="es" sz="1300">
+                <a:solidFill>
+                  <a:srgbClr val="375FA9"/>
+                </a:solidFill>
+                <a:latin typeface="Consolas"/>
+                <a:ea typeface="Consolas"/>
+                <a:cs typeface="Consolas"/>
+                <a:sym typeface="Consolas"/>
+              </a:rPr>
+              <a:t>'</a:t>
+            </a:r>
+            <a:r>
+              <a:rPr lang="es" sz="1100">
+                <a:solidFill>
+                  <a:srgbClr val="375FA9"/>
+                </a:solidFill>
+                <a:latin typeface="Consolas"/>
+                <a:ea typeface="Consolas"/>
+                <a:cs typeface="Consolas"/>
+                <a:sym typeface="Consolas"/>
+              </a:rPr>
+              <a:t>, 2);</a:t>
             </a:r>
             <a:endParaRPr sz="1000">
               <a:solidFill>
@@ -24005,7 +24577,55 @@
                 <a:cs typeface="Consolas"/>
                 <a:sym typeface="Consolas"/>
               </a:rPr>
-              <a:t>  values(1009, 109899, ‘23/11/20’, 3);</a:t>
+              <a:t>  values(1009, 109899, </a:t>
+            </a:r>
+            <a:r>
+              <a:rPr lang="es" sz="1300">
+                <a:solidFill>
+                  <a:srgbClr val="375FA9"/>
+                </a:solidFill>
+                <a:latin typeface="Consolas"/>
+                <a:ea typeface="Consolas"/>
+                <a:cs typeface="Consolas"/>
+                <a:sym typeface="Consolas"/>
+              </a:rPr>
+              <a:t>'</a:t>
+            </a:r>
+            <a:r>
+              <a:rPr lang="es" sz="1100">
+                <a:solidFill>
+                  <a:srgbClr val="375FA9"/>
+                </a:solidFill>
+                <a:latin typeface="Consolas"/>
+                <a:ea typeface="Consolas"/>
+                <a:cs typeface="Consolas"/>
+                <a:sym typeface="Consolas"/>
+              </a:rPr>
+              <a:t>23/11/20</a:t>
+            </a:r>
+            <a:r>
+              <a:rPr lang="es" sz="1300">
+                <a:solidFill>
+                  <a:srgbClr val="375FA9"/>
+                </a:solidFill>
+                <a:latin typeface="Consolas"/>
+                <a:ea typeface="Consolas"/>
+                <a:cs typeface="Consolas"/>
+                <a:sym typeface="Consolas"/>
+              </a:rPr>
+              <a:t>'</a:t>
+            </a:r>
+            <a:r>
+              <a:rPr lang="es" sz="1100">
+                <a:solidFill>
+                  <a:srgbClr val="375FA9"/>
+                </a:solidFill>
+                <a:latin typeface="Consolas"/>
+                <a:ea typeface="Consolas"/>
+                <a:cs typeface="Consolas"/>
+                <a:sym typeface="Consolas"/>
+              </a:rPr>
+              <a:t>, 3);</a:t>
             </a:r>
             <a:endParaRPr sz="1100">
               <a:solidFill>
@@ -24075,7 +24695,55 @@
                 <a:cs typeface="Consolas"/>
                 <a:sym typeface="Consolas"/>
               </a:rPr>
-              <a:t>  values(1018, 104695, ‘1/12/20’, 2);</a:t>
+              <a:t>  values(1018, 104695, </a:t>
+            </a:r>
+            <a:r>
+              <a:rPr lang="es" sz="1300">
+                <a:solidFill>
+                  <a:srgbClr val="375FA9"/>
+                </a:solidFill>
+                <a:latin typeface="Consolas"/>
+                <a:ea typeface="Consolas"/>
+                <a:cs typeface="Consolas"/>
+                <a:sym typeface="Consolas"/>
+              </a:rPr>
+              <a:t>'</a:t>
+            </a:r>
+            <a:r>
+              <a:rPr lang="es" sz="1100">
+                <a:solidFill>
+                  <a:srgbClr val="375FA9"/>
+                </a:solidFill>
+                <a:latin typeface="Consolas"/>
+                <a:ea typeface="Consolas"/>
+                <a:cs typeface="Consolas"/>
+                <a:sym typeface="Consolas"/>
+              </a:rPr>
+              <a:t>1/12/20</a:t>
+            </a:r>
+            <a:r>
+              <a:rPr lang="es" sz="1300">
+                <a:solidFill>
+                  <a:srgbClr val="375FA9"/>
+                </a:solidFill>
+                <a:latin typeface="Consolas"/>
+                <a:ea typeface="Consolas"/>
+                <a:cs typeface="Consolas"/>
+                <a:sym typeface="Consolas"/>
+              </a:rPr>
+              <a:t>'</a:t>
+            </a:r>
+            <a:r>
+              <a:rPr lang="es" sz="1100">
+                <a:solidFill>
+                  <a:srgbClr val="375FA9"/>
+                </a:solidFill>
+                <a:latin typeface="Consolas"/>
+                <a:ea typeface="Consolas"/>
+                <a:cs typeface="Consolas"/>
+                <a:sym typeface="Consolas"/>
+              </a:rPr>
+              <a:t>, 2);</a:t>
             </a:r>
             <a:endParaRPr sz="1000">
               <a:solidFill>
@@ -24158,7 +24826,7 @@
     </p:bg>
     <p:spTree>
       <p:nvGrpSpPr>
-        <p:cNvPr id="242" name="Shape 242"/>
+        <p:cNvPr id="244" name="Shape 244"/>
         <p:cNvGrpSpPr/>
         <p:nvPr/>
       </p:nvGrpSpPr>
@@ -24172,7 +24840,7 @@
       </p:grpSpPr>
       <p:sp>
         <p:nvSpPr>
-          <p:cNvPr id="243" name="Google Shape;243;p31"/>
+          <p:cNvPr id="245" name="Google Shape;245;p31"/>
           <p:cNvSpPr txBox="1"/>
           <p:nvPr/>
         </p:nvSpPr>
@@ -24240,7 +24908,7 @@
       </p:sp>
       <p:sp>
         <p:nvSpPr>
-          <p:cNvPr id="244" name="Google Shape;244;p31"/>
+          <p:cNvPr id="246" name="Google Shape;246;p31"/>
           <p:cNvSpPr txBox="1"/>
           <p:nvPr/>
         </p:nvSpPr>
@@ -24833,7 +25501,7 @@
     </p:bg>
     <p:spTree>
       <p:nvGrpSpPr>
-        <p:cNvPr id="248" name="Shape 248"/>
+        <p:cNvPr id="250" name="Shape 250"/>
         <p:cNvGrpSpPr/>
         <p:nvPr/>
       </p:nvGrpSpPr>
@@ -24847,7 +25515,7 @@
       </p:grpSpPr>
       <p:sp>
         <p:nvSpPr>
-          <p:cNvPr id="249" name="Google Shape;249;p32"/>
+          <p:cNvPr id="251" name="Google Shape;251;p32"/>
           <p:cNvSpPr txBox="1"/>
           <p:nvPr/>
         </p:nvSpPr>
@@ -24900,7 +25568,7 @@
       </p:sp>
       <p:sp>
         <p:nvSpPr>
-          <p:cNvPr id="250" name="Google Shape;250;p32"/>
+          <p:cNvPr id="252" name="Google Shape;252;p32"/>
           <p:cNvSpPr txBox="1"/>
           <p:nvPr/>
         </p:nvSpPr>
@@ -25029,7 +25697,7 @@
     </p:bg>
     <p:spTree>
       <p:nvGrpSpPr>
-        <p:cNvPr id="254" name="Shape 254"/>
+        <p:cNvPr id="256" name="Shape 256"/>
         <p:cNvGrpSpPr/>
         <p:nvPr/>
       </p:nvGrpSpPr>
@@ -25043,7 +25711,7 @@
       </p:grpSpPr>
       <p:sp>
         <p:nvSpPr>
-          <p:cNvPr id="255" name="Google Shape;255;p33"/>
+          <p:cNvPr id="257" name="Google Shape;257;p33"/>
           <p:cNvSpPr txBox="1"/>
           <p:nvPr/>
         </p:nvSpPr>
@@ -25111,7 +25779,7 @@
       </p:sp>
       <p:sp>
         <p:nvSpPr>
-          <p:cNvPr id="256" name="Google Shape;256;p33"/>
+          <p:cNvPr id="258" name="Google Shape;258;p33"/>
           <p:cNvSpPr txBox="1"/>
           <p:nvPr/>
         </p:nvSpPr>
@@ -25554,7 +26222,7 @@
     </p:bg>
     <p:spTree>
       <p:nvGrpSpPr>
-        <p:cNvPr id="260" name="Shape 260"/>
+        <p:cNvPr id="262" name="Shape 262"/>
         <p:cNvGrpSpPr/>
         <p:nvPr/>
       </p:nvGrpSpPr>
@@ -25568,7 +26236,7 @@
       </p:grpSpPr>
       <p:sp>
         <p:nvSpPr>
-          <p:cNvPr id="261" name="Google Shape;261;p34"/>
+          <p:cNvPr id="263" name="Google Shape;263;p34"/>
           <p:cNvSpPr txBox="1"/>
           <p:nvPr/>
         </p:nvSpPr>
@@ -25640,7 +26308,7 @@
       </p:sp>
       <p:sp>
         <p:nvSpPr>
-          <p:cNvPr id="262" name="Google Shape;262;p34"/>
+          <p:cNvPr id="264" name="Google Shape;264;p34"/>
           <p:cNvSpPr txBox="1"/>
           <p:nvPr/>
         </p:nvSpPr>
@@ -25864,7 +26532,7 @@
     </p:bg>
     <p:spTree>
       <p:nvGrpSpPr>
-        <p:cNvPr id="266" name="Shape 266"/>
+        <p:cNvPr id="268" name="Shape 268"/>
         <p:cNvGrpSpPr/>
         <p:nvPr/>
       </p:nvGrpSpPr>
@@ -25878,7 +26546,7 @@
       </p:grpSpPr>
       <p:sp>
         <p:nvSpPr>
-          <p:cNvPr id="267" name="Google Shape;267;p35"/>
+          <p:cNvPr id="269" name="Google Shape;269;p35"/>
           <p:cNvSpPr txBox="1"/>
           <p:nvPr/>
         </p:nvSpPr>
@@ -25946,7 +26614,7 @@
       </p:sp>
       <p:sp>
         <p:nvSpPr>
-          <p:cNvPr id="268" name="Google Shape;268;p35"/>
+          <p:cNvPr id="270" name="Google Shape;270;p35"/>
           <p:cNvSpPr txBox="1"/>
           <p:nvPr/>
         </p:nvSpPr>
@@ -26094,7 +26762,7 @@
       </p:sp>
       <p:sp>
         <p:nvSpPr>
-          <p:cNvPr id="269" name="Google Shape;269;p35"/>
+          <p:cNvPr id="271" name="Google Shape;271;p35"/>
           <p:cNvSpPr txBox="1"/>
           <p:nvPr/>
         </p:nvSpPr>
@@ -26200,7 +26868,31 @@
                 <a:cs typeface="Consolas"/>
                 <a:sym typeface="Consolas"/>
               </a:rPr>
-              <a:t>r el modulo sqlite3</a:t>
+              <a:t>r el </a:t>
+            </a:r>
+            <a:r>
+              <a:rPr lang="es">
+                <a:solidFill>
+                  <a:srgbClr val="375FA9"/>
+                </a:solidFill>
+                <a:latin typeface="Consolas"/>
+                <a:ea typeface="Consolas"/>
+                <a:cs typeface="Consolas"/>
+                <a:sym typeface="Consolas"/>
+              </a:rPr>
+              <a:t>módulo</a:t>
+            </a:r>
+            <a:r>
+              <a:rPr i="0" lang="es" sz="1400" u="none" cap="none" strike="noStrike">
+                <a:solidFill>
+                  <a:srgbClr val="375FA9"/>
+                </a:solidFill>
+                <a:latin typeface="Consolas"/>
+                <a:ea typeface="Consolas"/>
+                <a:cs typeface="Consolas"/>
+                <a:sym typeface="Consolas"/>
+              </a:rPr>
+              <a:t> sqlite3</a:t>
             </a:r>
             <a:endParaRPr>
               <a:latin typeface="Consolas"/>
@@ -26374,7 +27066,7 @@
     </p:bg>
     <p:spTree>
       <p:nvGrpSpPr>
-        <p:cNvPr id="273" name="Shape 273"/>
+        <p:cNvPr id="275" name="Shape 275"/>
         <p:cNvGrpSpPr/>
         <p:nvPr/>
       </p:nvGrpSpPr>
@@ -26388,7 +27080,7 @@
       </p:grpSpPr>
       <p:sp>
         <p:nvSpPr>
-          <p:cNvPr id="274" name="Google Shape;274;p36"/>
+          <p:cNvPr id="276" name="Google Shape;276;p36"/>
           <p:cNvSpPr txBox="1"/>
           <p:nvPr/>
         </p:nvSpPr>
@@ -26468,7 +27160,7 @@
       </p:sp>
       <p:sp>
         <p:nvSpPr>
-          <p:cNvPr id="275" name="Google Shape;275;p36"/>
+          <p:cNvPr id="277" name="Google Shape;277;p36"/>
           <p:cNvSpPr txBox="1"/>
           <p:nvPr/>
         </p:nvSpPr>
@@ -26642,7 +27334,7 @@
       </p:sp>
       <p:sp>
         <p:nvSpPr>
-          <p:cNvPr id="276" name="Google Shape;276;p36"/>
+          <p:cNvPr id="278" name="Google Shape;278;p36"/>
           <p:cNvSpPr txBox="1"/>
           <p:nvPr/>
         </p:nvSpPr>
@@ -26951,7 +27643,7 @@
     </p:bg>
     <p:spTree>
       <p:nvGrpSpPr>
-        <p:cNvPr id="280" name="Shape 280"/>
+        <p:cNvPr id="282" name="Shape 282"/>
         <p:cNvGrpSpPr/>
         <p:nvPr/>
       </p:nvGrpSpPr>
@@ -26965,7 +27657,7 @@
       </p:grpSpPr>
       <p:sp>
         <p:nvSpPr>
-          <p:cNvPr id="281" name="Google Shape;281;p37"/>
+          <p:cNvPr id="283" name="Google Shape;283;p37"/>
           <p:cNvSpPr txBox="1"/>
           <p:nvPr/>
         </p:nvSpPr>
@@ -27045,7 +27737,7 @@
       </p:sp>
       <p:sp>
         <p:nvSpPr>
-          <p:cNvPr id="282" name="Google Shape;282;p37"/>
+          <p:cNvPr id="284" name="Google Shape;284;p37"/>
           <p:cNvSpPr txBox="1"/>
           <p:nvPr/>
         </p:nvSpPr>
@@ -27139,7 +27831,7 @@
       </p:sp>
       <p:pic>
         <p:nvPicPr>
-          <p:cNvPr id="283" name="Google Shape;283;p37"/>
+          <p:cNvPr id="285" name="Google Shape;285;p37"/>
           <p:cNvPicPr preferRelativeResize="0"/>
           <p:nvPr/>
         </p:nvPicPr>
@@ -27189,7 +27881,7 @@
     </p:bg>
     <p:spTree>
       <p:nvGrpSpPr>
-        <p:cNvPr id="287" name="Shape 287"/>
+        <p:cNvPr id="289" name="Shape 289"/>
         <p:cNvGrpSpPr/>
         <p:nvPr/>
       </p:nvGrpSpPr>
@@ -27203,7 +27895,7 @@
       </p:grpSpPr>
       <p:sp>
         <p:nvSpPr>
-          <p:cNvPr id="288" name="Google Shape;288;p38"/>
+          <p:cNvPr id="290" name="Google Shape;290;p38"/>
           <p:cNvSpPr txBox="1"/>
           <p:nvPr/>
         </p:nvSpPr>
@@ -27283,7 +27975,7 @@
       </p:sp>
       <p:sp>
         <p:nvSpPr>
-          <p:cNvPr id="289" name="Google Shape;289;p38"/>
+          <p:cNvPr id="291" name="Google Shape;291;p38"/>
           <p:cNvSpPr txBox="1"/>
           <p:nvPr/>
         </p:nvSpPr>
@@ -27728,7 +28420,7 @@
     </p:bg>
     <p:spTree>
       <p:nvGrpSpPr>
-        <p:cNvPr id="293" name="Shape 293"/>
+        <p:cNvPr id="295" name="Shape 295"/>
         <p:cNvGrpSpPr/>
         <p:nvPr/>
       </p:nvGrpSpPr>
@@ -27742,7 +28434,7 @@
       </p:grpSpPr>
       <p:sp>
         <p:nvSpPr>
-          <p:cNvPr id="294" name="Google Shape;294;p39"/>
+          <p:cNvPr id="296" name="Google Shape;296;p39"/>
           <p:cNvSpPr txBox="1"/>
           <p:nvPr/>
         </p:nvSpPr>
@@ -27810,7 +28502,7 @@
       </p:sp>
       <p:sp>
         <p:nvSpPr>
-          <p:cNvPr id="295" name="Google Shape;295;p39"/>
+          <p:cNvPr id="297" name="Google Shape;297;p39"/>
           <p:cNvSpPr txBox="1"/>
           <p:nvPr/>
         </p:nvSpPr>
@@ -27920,7 +28612,7 @@
       </p:sp>
       <p:sp>
         <p:nvSpPr>
-          <p:cNvPr id="296" name="Google Shape;296;p39"/>
+          <p:cNvPr id="298" name="Google Shape;298;p39"/>
           <p:cNvSpPr txBox="1"/>
           <p:nvPr/>
         </p:nvSpPr>
@@ -28228,7 +28920,7 @@
     </p:bg>
     <p:spTree>
       <p:nvGrpSpPr>
-        <p:cNvPr id="300" name="Shape 300"/>
+        <p:cNvPr id="302" name="Shape 302"/>
         <p:cNvGrpSpPr/>
         <p:nvPr/>
       </p:nvGrpSpPr>
@@ -28242,7 +28934,7 @@
       </p:grpSpPr>
       <p:sp>
         <p:nvSpPr>
-          <p:cNvPr id="301" name="Google Shape;301;p40"/>
+          <p:cNvPr id="303" name="Google Shape;303;p40"/>
           <p:cNvSpPr txBox="1"/>
           <p:nvPr/>
         </p:nvSpPr>
@@ -28322,7 +29014,7 @@
       </p:sp>
       <p:sp>
         <p:nvSpPr>
-          <p:cNvPr id="302" name="Google Shape;302;p40"/>
+          <p:cNvPr id="304" name="Google Shape;304;p40"/>
           <p:cNvSpPr txBox="1"/>
           <p:nvPr/>
         </p:nvSpPr>
@@ -28379,7 +29071,7 @@
       </p:sp>
       <p:sp>
         <p:nvSpPr>
-          <p:cNvPr id="303" name="Google Shape;303;p40"/>
+          <p:cNvPr id="305" name="Google Shape;305;p40"/>
           <p:cNvSpPr txBox="1"/>
           <p:nvPr/>
         </p:nvSpPr>
@@ -28687,7 +29379,7 @@
     </p:bg>
     <p:spTree>
       <p:nvGrpSpPr>
-        <p:cNvPr id="307" name="Shape 307"/>
+        <p:cNvPr id="309" name="Shape 309"/>
         <p:cNvGrpSpPr/>
         <p:nvPr/>
       </p:nvGrpSpPr>
@@ -28701,7 +29393,7 @@
       </p:grpSpPr>
       <p:sp>
         <p:nvSpPr>
-          <p:cNvPr id="308" name="Google Shape;308;p41"/>
+          <p:cNvPr id="310" name="Google Shape;310;p41"/>
           <p:cNvSpPr txBox="1"/>
           <p:nvPr/>
         </p:nvSpPr>
@@ -28781,7 +29473,7 @@
       </p:sp>
       <p:sp>
         <p:nvSpPr>
-          <p:cNvPr id="309" name="Google Shape;309;p41"/>
+          <p:cNvPr id="311" name="Google Shape;311;p41"/>
           <p:cNvSpPr txBox="1"/>
           <p:nvPr/>
         </p:nvSpPr>
@@ -28838,7 +29530,7 @@
       </p:sp>
       <p:sp>
         <p:nvSpPr>
-          <p:cNvPr id="310" name="Google Shape;310;p41"/>
+          <p:cNvPr id="312" name="Google Shape;312;p41"/>
           <p:cNvSpPr txBox="1"/>
           <p:nvPr/>
         </p:nvSpPr>
@@ -29146,7 +29838,7 @@
     </p:bg>
     <p:spTree>
       <p:nvGrpSpPr>
-        <p:cNvPr id="314" name="Shape 314"/>
+        <p:cNvPr id="316" name="Shape 316"/>
         <p:cNvGrpSpPr/>
         <p:nvPr/>
       </p:nvGrpSpPr>
@@ -29160,7 +29852,7 @@
       </p:grpSpPr>
       <p:sp>
         <p:nvSpPr>
-          <p:cNvPr id="315" name="Google Shape;315;p42"/>
+          <p:cNvPr id="317" name="Google Shape;317;p42"/>
           <p:cNvSpPr txBox="1"/>
           <p:nvPr/>
         </p:nvSpPr>
@@ -29228,7 +29920,7 @@
       </p:sp>
       <p:sp>
         <p:nvSpPr>
-          <p:cNvPr id="316" name="Google Shape;316;p42"/>
+          <p:cNvPr id="318" name="Google Shape;318;p42"/>
           <p:cNvSpPr txBox="1"/>
           <p:nvPr/>
         </p:nvSpPr>
@@ -29502,7 +30194,7 @@
     </p:bg>
     <p:spTree>
       <p:nvGrpSpPr>
-        <p:cNvPr id="320" name="Shape 320"/>
+        <p:cNvPr id="322" name="Shape 322"/>
         <p:cNvGrpSpPr/>
         <p:nvPr/>
       </p:nvGrpSpPr>
@@ -29516,7 +30208,7 @@
       </p:grpSpPr>
       <p:sp>
         <p:nvSpPr>
-          <p:cNvPr id="321" name="Google Shape;321;p43"/>
+          <p:cNvPr id="323" name="Google Shape;323;p43"/>
           <p:cNvSpPr txBox="1"/>
           <p:nvPr/>
         </p:nvSpPr>
@@ -29596,7 +30288,7 @@
       </p:sp>
       <p:sp>
         <p:nvSpPr>
-          <p:cNvPr id="322" name="Google Shape;322;p43"/>
+          <p:cNvPr id="324" name="Google Shape;324;p43"/>
           <p:cNvSpPr txBox="1"/>
           <p:nvPr/>
         </p:nvSpPr>
@@ -30342,7 +31034,7 @@
     </p:bg>
     <p:spTree>
       <p:nvGrpSpPr>
-        <p:cNvPr id="326" name="Shape 326"/>
+        <p:cNvPr id="328" name="Shape 328"/>
         <p:cNvGrpSpPr/>
         <p:nvPr/>
       </p:nvGrpSpPr>
@@ -30356,7 +31048,7 @@
       </p:grpSpPr>
       <p:sp>
         <p:nvSpPr>
-          <p:cNvPr id="327" name="Google Shape;327;p44"/>
+          <p:cNvPr id="329" name="Google Shape;329;p44"/>
           <p:cNvSpPr txBox="1"/>
           <p:nvPr/>
         </p:nvSpPr>
@@ -30436,7 +31128,7 @@
       </p:sp>
       <p:sp>
         <p:nvSpPr>
-          <p:cNvPr id="328" name="Google Shape;328;p44"/>
+          <p:cNvPr id="330" name="Google Shape;330;p44"/>
           <p:cNvSpPr txBox="1"/>
           <p:nvPr/>
         </p:nvSpPr>
@@ -30945,7 +31637,7 @@
     </p:bg>
     <p:spTree>
       <p:nvGrpSpPr>
-        <p:cNvPr id="332" name="Shape 332"/>
+        <p:cNvPr id="334" name="Shape 334"/>
         <p:cNvGrpSpPr/>
         <p:nvPr/>
       </p:nvGrpSpPr>
@@ -30959,7 +31651,7 @@
       </p:grpSpPr>
       <p:sp>
         <p:nvSpPr>
-          <p:cNvPr id="333" name="Google Shape;333;p45"/>
+          <p:cNvPr id="335" name="Google Shape;335;p45"/>
           <p:cNvSpPr txBox="1"/>
           <p:nvPr/>
         </p:nvSpPr>
@@ -31039,7 +31731,7 @@
       </p:sp>
       <p:sp>
         <p:nvSpPr>
-          <p:cNvPr id="334" name="Google Shape;334;p45"/>
+          <p:cNvPr id="336" name="Google Shape;336;p45"/>
           <p:cNvSpPr txBox="1"/>
           <p:nvPr/>
         </p:nvSpPr>
@@ -31417,7 +32109,7 @@
     </p:bg>
     <p:spTree>
       <p:nvGrpSpPr>
-        <p:cNvPr id="338" name="Shape 338"/>
+        <p:cNvPr id="340" name="Shape 340"/>
         <p:cNvGrpSpPr/>
         <p:nvPr/>
       </p:nvGrpSpPr>
@@ -31431,7 +32123,7 @@
       </p:grpSpPr>
       <p:sp>
         <p:nvSpPr>
-          <p:cNvPr id="339" name="Google Shape;339;p46"/>
+          <p:cNvPr id="341" name="Google Shape;341;p46"/>
           <p:cNvSpPr txBox="1"/>
           <p:nvPr/>
         </p:nvSpPr>
@@ -31511,7 +32203,7 @@
       </p:sp>
       <p:sp>
         <p:nvSpPr>
-          <p:cNvPr id="340" name="Google Shape;340;p46"/>
+          <p:cNvPr id="342" name="Google Shape;342;p46"/>
           <p:cNvSpPr txBox="1"/>
           <p:nvPr/>
         </p:nvSpPr>
@@ -31807,7 +32499,7 @@
     </p:bg>
     <p:spTree>
       <p:nvGrpSpPr>
-        <p:cNvPr id="344" name="Shape 344"/>
+        <p:cNvPr id="346" name="Shape 346"/>
         <p:cNvGrpSpPr/>
         <p:nvPr/>
       </p:nvGrpSpPr>
@@ -31821,7 +32513,7 @@
       </p:grpSpPr>
       <p:sp>
         <p:nvSpPr>
-          <p:cNvPr id="345" name="Google Shape;345;p47"/>
+          <p:cNvPr id="347" name="Google Shape;347;p47"/>
           <p:cNvSpPr txBox="1"/>
           <p:nvPr/>
         </p:nvSpPr>
@@ -31889,7 +32581,7 @@
       </p:sp>
       <p:sp>
         <p:nvSpPr>
-          <p:cNvPr id="346" name="Google Shape;346;p47"/>
+          <p:cNvPr id="348" name="Google Shape;348;p47"/>
           <p:cNvSpPr txBox="1"/>
           <p:nvPr/>
         </p:nvSpPr>
@@ -32119,7 +32811,7 @@
       </p:sp>
       <p:sp>
         <p:nvSpPr>
-          <p:cNvPr id="347" name="Google Shape;347;p47"/>
+          <p:cNvPr id="349" name="Google Shape;349;p47"/>
           <p:cNvSpPr txBox="1"/>
           <p:nvPr/>
         </p:nvSpPr>
@@ -32504,7 +33196,7 @@
     </p:bg>
     <p:spTree>
       <p:nvGrpSpPr>
-        <p:cNvPr id="351" name="Shape 351"/>
+        <p:cNvPr id="353" name="Shape 353"/>
         <p:cNvGrpSpPr/>
         <p:nvPr/>
       </p:nvGrpSpPr>
@@ -32518,7 +33210,7 @@
       </p:grpSpPr>
       <p:sp>
         <p:nvSpPr>
-          <p:cNvPr id="352" name="Google Shape;352;p48"/>
+          <p:cNvPr id="354" name="Google Shape;354;p48"/>
           <p:cNvSpPr txBox="1"/>
           <p:nvPr/>
         </p:nvSpPr>
@@ -32598,7 +33290,7 @@
       </p:sp>
       <p:sp>
         <p:nvSpPr>
-          <p:cNvPr id="353" name="Google Shape;353;p48"/>
+          <p:cNvPr id="355" name="Google Shape;355;p48"/>
           <p:cNvSpPr txBox="1"/>
           <p:nvPr/>
         </p:nvSpPr>
@@ -32918,7 +33610,7 @@
     </p:bg>
     <p:spTree>
       <p:nvGrpSpPr>
-        <p:cNvPr id="357" name="Shape 357"/>
+        <p:cNvPr id="359" name="Shape 359"/>
         <p:cNvGrpSpPr/>
         <p:nvPr/>
       </p:nvGrpSpPr>
@@ -32932,7 +33624,7 @@
       </p:grpSpPr>
       <p:sp>
         <p:nvSpPr>
-          <p:cNvPr id="358" name="Google Shape;358;p49"/>
+          <p:cNvPr id="360" name="Google Shape;360;p49"/>
           <p:cNvSpPr txBox="1"/>
           <p:nvPr/>
         </p:nvSpPr>
@@ -33012,7 +33704,7 @@
       </p:sp>
       <p:sp>
         <p:nvSpPr>
-          <p:cNvPr id="359" name="Google Shape;359;p49"/>
+          <p:cNvPr id="361" name="Google Shape;361;p49"/>
           <p:cNvSpPr txBox="1"/>
           <p:nvPr/>
         </p:nvSpPr>
@@ -33122,7 +33814,7 @@
       </p:sp>
       <p:sp>
         <p:nvSpPr>
-          <p:cNvPr id="360" name="Google Shape;360;p49"/>
+          <p:cNvPr id="362" name="Google Shape;362;p49"/>
           <p:cNvSpPr txBox="1"/>
           <p:nvPr/>
         </p:nvSpPr>
@@ -33544,7 +34236,7 @@
     </p:bg>
     <p:spTree>
       <p:nvGrpSpPr>
-        <p:cNvPr id="364" name="Shape 364"/>
+        <p:cNvPr id="366" name="Shape 366"/>
         <p:cNvGrpSpPr/>
         <p:nvPr/>
       </p:nvGrpSpPr>
@@ -33558,7 +34250,7 @@
       </p:grpSpPr>
       <p:sp>
         <p:nvSpPr>
-          <p:cNvPr id="365" name="Google Shape;365;p50"/>
+          <p:cNvPr id="367" name="Google Shape;367;p50"/>
           <p:cNvSpPr txBox="1"/>
           <p:nvPr/>
         </p:nvSpPr>
@@ -33638,7 +34330,7 @@
       </p:sp>
       <p:sp>
         <p:nvSpPr>
-          <p:cNvPr id="366" name="Google Shape;366;p50"/>
+          <p:cNvPr id="368" name="Google Shape;368;p50"/>
           <p:cNvSpPr txBox="1"/>
           <p:nvPr/>
         </p:nvSpPr>
@@ -33917,7 +34609,7 @@
     </p:bg>
     <p:spTree>
       <p:nvGrpSpPr>
-        <p:cNvPr id="370" name="Shape 370"/>
+        <p:cNvPr id="372" name="Shape 372"/>
         <p:cNvGrpSpPr/>
         <p:nvPr/>
       </p:nvGrpSpPr>
@@ -33931,7 +34623,7 @@
       </p:grpSpPr>
       <p:sp>
         <p:nvSpPr>
-          <p:cNvPr id="371" name="Google Shape;371;p51"/>
+          <p:cNvPr id="373" name="Google Shape;373;p51"/>
           <p:cNvSpPr txBox="1"/>
           <p:nvPr/>
         </p:nvSpPr>
@@ -34011,7 +34703,7 @@
       </p:sp>
       <p:sp>
         <p:nvSpPr>
-          <p:cNvPr id="372" name="Google Shape;372;p51"/>
+          <p:cNvPr id="374" name="Google Shape;374;p51"/>
           <p:cNvSpPr txBox="1"/>
           <p:nvPr/>
         </p:nvSpPr>
@@ -34227,7 +34919,7 @@
       </p:sp>
       <p:pic>
         <p:nvPicPr>
-          <p:cNvPr id="373" name="Google Shape;373;p51"/>
+          <p:cNvPr id="375" name="Google Shape;375;p51"/>
           <p:cNvPicPr preferRelativeResize="0"/>
           <p:nvPr/>
         </p:nvPicPr>
@@ -34277,7 +34969,7 @@
     </p:bg>
     <p:spTree>
       <p:nvGrpSpPr>
-        <p:cNvPr id="377" name="Shape 377"/>
+        <p:cNvPr id="379" name="Shape 379"/>
         <p:cNvGrpSpPr/>
         <p:nvPr/>
       </p:nvGrpSpPr>
@@ -34291,7 +34983,7 @@
       </p:grpSpPr>
       <p:sp>
         <p:nvSpPr>
-          <p:cNvPr id="378" name="Google Shape;378;p52"/>
+          <p:cNvPr id="380" name="Google Shape;380;p52"/>
           <p:cNvSpPr txBox="1"/>
           <p:nvPr/>
         </p:nvSpPr>
@@ -34359,7 +35051,7 @@
       </p:sp>
       <p:sp>
         <p:nvSpPr>
-          <p:cNvPr id="379" name="Google Shape;379;p52"/>
+          <p:cNvPr id="381" name="Google Shape;381;p52"/>
           <p:cNvSpPr txBox="1"/>
           <p:nvPr/>
         </p:nvSpPr>
@@ -34552,7 +35244,7 @@
       </p:sp>
       <p:sp>
         <p:nvSpPr>
-          <p:cNvPr id="380" name="Google Shape;380;p52"/>
+          <p:cNvPr id="382" name="Google Shape;382;p52"/>
           <p:cNvSpPr/>
           <p:nvPr/>
         </p:nvSpPr>
@@ -35230,7 +35922,7 @@
     </p:bg>
     <p:spTree>
       <p:nvGrpSpPr>
-        <p:cNvPr id="384" name="Shape 384"/>
+        <p:cNvPr id="386" name="Shape 386"/>
         <p:cNvGrpSpPr/>
         <p:nvPr/>
       </p:nvGrpSpPr>
@@ -35244,7 +35936,7 @@
       </p:grpSpPr>
       <p:sp>
         <p:nvSpPr>
-          <p:cNvPr id="385" name="Google Shape;385;p53"/>
+          <p:cNvPr id="387" name="Google Shape;387;p53"/>
           <p:cNvSpPr txBox="1"/>
           <p:nvPr/>
         </p:nvSpPr>
@@ -35312,7 +36004,7 @@
       </p:sp>
       <p:sp>
         <p:nvSpPr>
-          <p:cNvPr id="386" name="Google Shape;386;p53"/>
+          <p:cNvPr id="388" name="Google Shape;388;p53"/>
           <p:cNvSpPr txBox="1"/>
           <p:nvPr/>
         </p:nvSpPr>
@@ -35545,7 +36237,7 @@
       </p:sp>
       <p:pic>
         <p:nvPicPr>
-          <p:cNvPr id="387" name="Google Shape;387;p53"/>
+          <p:cNvPr id="389" name="Google Shape;389;p53"/>
           <p:cNvPicPr preferRelativeResize="0"/>
           <p:nvPr/>
         </p:nvPicPr>
@@ -35976,7 +36668,7 @@
     </p:bg>
     <p:spTree>
       <p:nvGrpSpPr>
-        <p:cNvPr id="391" name="Shape 391"/>
+        <p:cNvPr id="393" name="Shape 393"/>
         <p:cNvGrpSpPr/>
         <p:nvPr/>
       </p:nvGrpSpPr>
@@ -35990,7 +36682,7 @@
       </p:grpSpPr>
       <p:sp>
         <p:nvSpPr>
-          <p:cNvPr id="392" name="Google Shape;392;p54"/>
+          <p:cNvPr id="394" name="Google Shape;394;p54"/>
           <p:cNvSpPr txBox="1"/>
           <p:nvPr/>
         </p:nvSpPr>
@@ -36058,7 +36750,7 @@
       </p:sp>
       <p:sp>
         <p:nvSpPr>
-          <p:cNvPr id="393" name="Google Shape;393;p54"/>
+          <p:cNvPr id="395" name="Google Shape;395;p54"/>
           <p:cNvSpPr txBox="1"/>
           <p:nvPr/>
         </p:nvSpPr>
@@ -36261,7 +36953,7 @@
     </p:bg>
     <p:spTree>
       <p:nvGrpSpPr>
-        <p:cNvPr id="397" name="Shape 397"/>
+        <p:cNvPr id="399" name="Shape 399"/>
         <p:cNvGrpSpPr/>
         <p:nvPr/>
       </p:nvGrpSpPr>
@@ -36275,7 +36967,7 @@
       </p:grpSpPr>
       <p:sp>
         <p:nvSpPr>
-          <p:cNvPr id="398" name="Google Shape;398;p55"/>
+          <p:cNvPr id="400" name="Google Shape;400;p55"/>
           <p:cNvSpPr txBox="1"/>
           <p:nvPr/>
         </p:nvSpPr>
@@ -36355,7 +37047,7 @@
       </p:sp>
       <p:sp>
         <p:nvSpPr>
-          <p:cNvPr id="399" name="Google Shape;399;p55"/>
+          <p:cNvPr id="401" name="Google Shape;401;p55"/>
           <p:cNvSpPr txBox="1"/>
           <p:nvPr/>
         </p:nvSpPr>
@@ -36549,7 +37241,7 @@
     </p:bg>
     <p:spTree>
       <p:nvGrpSpPr>
-        <p:cNvPr id="403" name="Shape 403"/>
+        <p:cNvPr id="405" name="Shape 405"/>
         <p:cNvGrpSpPr/>
         <p:nvPr/>
       </p:nvGrpSpPr>
@@ -36563,7 +37255,7 @@
       </p:grpSpPr>
       <p:sp>
         <p:nvSpPr>
-          <p:cNvPr id="404" name="Google Shape;404;p56"/>
+          <p:cNvPr id="406" name="Google Shape;406;p56"/>
           <p:cNvSpPr txBox="1"/>
           <p:nvPr/>
         </p:nvSpPr>
@@ -36639,7 +37331,7 @@
     </p:bg>
     <p:spTree>
       <p:nvGrpSpPr>
-        <p:cNvPr id="408" name="Shape 408"/>
+        <p:cNvPr id="410" name="Shape 410"/>
         <p:cNvGrpSpPr/>
         <p:nvPr/>
       </p:nvGrpSpPr>
@@ -36653,7 +37345,7 @@
       </p:grpSpPr>
       <p:sp>
         <p:nvSpPr>
-          <p:cNvPr id="409" name="Google Shape;409;p57"/>
+          <p:cNvPr id="411" name="Google Shape;411;p57"/>
           <p:cNvSpPr txBox="1"/>
           <p:nvPr>
             <p:ph type="title"/>
@@ -36752,7 +37444,7 @@
       </p:sp>
       <p:pic>
         <p:nvPicPr>
-          <p:cNvPr id="410" name="Google Shape;410;p57"/>
+          <p:cNvPr id="412" name="Google Shape;412;p57"/>
           <p:cNvPicPr preferRelativeResize="0"/>
           <p:nvPr/>
         </p:nvPicPr>
@@ -36779,7 +37471,7 @@
       </p:pic>
       <p:sp>
         <p:nvSpPr>
-          <p:cNvPr id="411" name="Google Shape;411;p57"/>
+          <p:cNvPr id="413" name="Google Shape;413;p57"/>
           <p:cNvSpPr txBox="1"/>
           <p:nvPr/>
         </p:nvSpPr>
@@ -36852,7 +37544,7 @@
       </p:sp>
       <p:sp>
         <p:nvSpPr>
-          <p:cNvPr id="412" name="Google Shape;412;p57"/>
+          <p:cNvPr id="414" name="Google Shape;414;p57"/>
           <p:cNvSpPr txBox="1"/>
           <p:nvPr/>
         </p:nvSpPr>
@@ -36941,7 +37633,7 @@
   <p:cSld>
     <p:spTree>
       <p:nvGrpSpPr>
-        <p:cNvPr id="416" name="Shape 416"/>
+        <p:cNvPr id="418" name="Shape 418"/>
         <p:cNvGrpSpPr/>
         <p:nvPr/>
       </p:nvGrpSpPr>
@@ -36955,7 +37647,7 @@
       </p:grpSpPr>
       <p:pic>
         <p:nvPicPr>
-          <p:cNvPr id="417" name="Google Shape;417;p58"/>
+          <p:cNvPr id="419" name="Google Shape;419;p58"/>
           <p:cNvPicPr preferRelativeResize="0"/>
           <p:nvPr/>
         </p:nvPicPr>

</xml_diff>